<commit_message>
Finished first draft of power-and-sample-size.Rmd
</commit_message>
<xml_diff>
--- a/power/power-and-sample-size-slides.pptx
+++ b/power/power-and-sample-size-slides.pptx
@@ -5,7 +5,7 @@
     <p:sldMasterId id="2147483648" r:id="rId1"/>
   </p:sldMasterIdLst>
   <p:notesMasterIdLst>
-    <p:notesMasterId r:id="rId11"/>
+    <p:notesMasterId r:id="rId24"/>
   </p:notesMasterIdLst>
   <p:sldIdLst>
     <p:sldId id="256" r:id="rId2"/>
@@ -17,6 +17,19 @@
     <p:sldId id="262" r:id="rId8"/>
     <p:sldId id="263" r:id="rId9"/>
     <p:sldId id="264" r:id="rId10"/>
+    <p:sldId id="265" r:id="rId11"/>
+    <p:sldId id="266" r:id="rId12"/>
+    <p:sldId id="267" r:id="rId13"/>
+    <p:sldId id="268" r:id="rId14"/>
+    <p:sldId id="269" r:id="rId15"/>
+    <p:sldId id="270" r:id="rId16"/>
+    <p:sldId id="271" r:id="rId17"/>
+    <p:sldId id="272" r:id="rId18"/>
+    <p:sldId id="273" r:id="rId19"/>
+    <p:sldId id="274" r:id="rId20"/>
+    <p:sldId id="275" r:id="rId21"/>
+    <p:sldId id="276" r:id="rId22"/>
+    <p:sldId id="277" r:id="rId23"/>
   </p:sldIdLst>
   <p:sldSz cx="12192000" cy="6858000"/>
   <p:notesSz cx="6858000" cy="9144000"/>
@@ -706,7 +719,7 @@
           <a:p>
             <a:fld id="{18BDFEC3-8487-43E8-A154-7C12CBC1FFF2}" type="slidenum">
               <a:rPr lang="en-US"/>
-              <a:t>4</a:t>
+              <a:t>5</a:t>
             </a:fld>
             <a:endParaRPr lang="en-US"/>
           </a:p>
@@ -788,7 +801,7 @@
           <a:p>
             <a:fld id="{18BDFEC3-8487-43E8-A154-7C12CBC1FFF2}" type="slidenum">
               <a:rPr lang="en-US"/>
-              <a:t>5</a:t>
+              <a:t>6</a:t>
             </a:fld>
             <a:endParaRPr lang="en-US"/>
           </a:p>
@@ -870,7 +883,7 @@
           <a:p>
             <a:fld id="{18BDFEC3-8487-43E8-A154-7C12CBC1FFF2}" type="slidenum">
               <a:rPr lang="en-US"/>
-              <a:t>6</a:t>
+              <a:t>7</a:t>
             </a:fld>
             <a:endParaRPr lang="en-US"/>
           </a:p>
@@ -952,7 +965,7 @@
           <a:p>
             <a:fld id="{18BDFEC3-8487-43E8-A154-7C12CBC1FFF2}" type="slidenum">
               <a:rPr lang="en-US"/>
-              <a:t>7</a:t>
+              <a:t>8</a:t>
             </a:fld>
             <a:endParaRPr lang="en-US"/>
           </a:p>
@@ -4022,6 +4035,2665 @@
 </p:sld>
 </file>
 
+<file path=ppt/slides/slide10.xml><?xml version="1.0" encoding="utf-8"?>
+<p:sld xmlns:a="http://schemas.openxmlformats.org/drawingml/2006/main" xmlns:r="http://schemas.openxmlformats.org/officeDocument/2006/relationships" xmlns:p="http://schemas.openxmlformats.org/presentationml/2006/main">
+  <p:cSld>
+    <p:spTree>
+      <p:nvGrpSpPr>
+        <p:cNvPr id="1" name=""/>
+        <p:cNvGrpSpPr/>
+        <p:nvPr/>
+      </p:nvGrpSpPr>
+      <p:grpSpPr>
+        <a:xfrm>
+          <a:off x="0" y="0"/>
+          <a:ext cx="0" cy="0"/>
+          <a:chOff x="0" y="0"/>
+          <a:chExt cx="0" cy="0"/>
+        </a:xfrm>
+      </p:grpSpPr>
+      <p:sp>
+        <p:nvSpPr>
+          <p:cNvPr id="2" name="Title 1"/>
+          <p:cNvSpPr>
+            <a:spLocks noGrp="1"/>
+          </p:cNvSpPr>
+          <p:nvPr>
+            <p:ph type="title"/>
+          </p:nvPr>
+        </p:nvSpPr>
+        <p:spPr/>
+        <p:txBody>
+          <a:bodyPr/>
+          <a:lstStyle/>
+          <a:p>
+            <a:pPr lvl="0" indent="0" marL="0">
+              <a:buNone/>
+            </a:pPr>
+            <a:r>
+              <a:rPr/>
+              <a:t>Software to calculate power and sample size: R</a:t>
+            </a:r>
+          </a:p>
+        </p:txBody>
+      </p:sp>
+      <p:sp>
+        <p:nvSpPr>
+          <p:cNvPr id="3" name="Content Placeholder 2"/>
+          <p:cNvSpPr>
+            <a:spLocks noGrp="1"/>
+          </p:cNvSpPr>
+          <p:nvPr>
+            <p:ph idx="1"/>
+          </p:nvPr>
+        </p:nvSpPr>
+        <p:spPr/>
+        <p:txBody>
+          <a:bodyPr/>
+          <a:lstStyle/>
+          <a:p>
+            <a:pPr lvl="0"/>
+            <a:r>
+              <a:rPr/>
+              <a:t>Program from scratch</a:t>
+            </a:r>
+          </a:p>
+          <a:p>
+            <a:pPr lvl="1"/>
+            <a:r>
+              <a:rPr/>
+              <a:t>qnorm</a:t>
+            </a:r>
+          </a:p>
+          <a:p>
+            <a:pPr lvl="1"/>
+            <a:r>
+              <a:rPr/>
+              <a:t>pt</a:t>
+            </a:r>
+          </a:p>
+          <a:p>
+            <a:pPr lvl="0"/>
+            <a:r>
+              <a:rPr/>
+              <a:t>stats library</a:t>
+            </a:r>
+          </a:p>
+          <a:p>
+            <a:pPr lvl="1"/>
+            <a:r>
+              <a:rPr/>
+              <a:t>power.t.test</a:t>
+            </a:r>
+          </a:p>
+          <a:p>
+            <a:pPr lvl="1"/>
+            <a:r>
+              <a:rPr/>
+              <a:t>Others (power.anova.test, power.prop.test)</a:t>
+            </a:r>
+          </a:p>
+        </p:txBody>
+      </p:sp>
+    </p:spTree>
+  </p:cSld>
+</p:sld>
+</file>
+
+<file path=ppt/slides/slide11.xml><?xml version="1.0" encoding="utf-8"?>
+<p:sld xmlns:a="http://schemas.openxmlformats.org/drawingml/2006/main" xmlns:r="http://schemas.openxmlformats.org/officeDocument/2006/relationships" xmlns:p="http://schemas.openxmlformats.org/presentationml/2006/main">
+  <p:cSld>
+    <p:spTree>
+      <p:nvGrpSpPr>
+        <p:cNvPr id="1" name=""/>
+        <p:cNvGrpSpPr/>
+        <p:nvPr/>
+      </p:nvGrpSpPr>
+      <p:grpSpPr>
+        <a:xfrm>
+          <a:off x="0" y="0"/>
+          <a:ext cx="0" cy="0"/>
+          <a:chOff x="0" y="0"/>
+          <a:chExt cx="0" cy="0"/>
+        </a:xfrm>
+      </p:grpSpPr>
+      <p:sp>
+        <p:nvSpPr>
+          <p:cNvPr id="2" name="Title 1"/>
+          <p:cNvSpPr>
+            <a:spLocks noGrp="1"/>
+          </p:cNvSpPr>
+          <p:nvPr>
+            <p:ph type="title"/>
+          </p:nvPr>
+        </p:nvSpPr>
+        <p:spPr/>
+        <p:txBody>
+          <a:bodyPr/>
+          <a:lstStyle/>
+          <a:p>
+            <a:pPr lvl="0" indent="0" marL="0">
+              <a:buNone/>
+            </a:pPr>
+            <a:r>
+              <a:rPr/>
+              <a:t>Independent samples t-test</a:t>
+            </a:r>
+          </a:p>
+        </p:txBody>
+      </p:sp>
+      <mc:AlternateContent xmlns:mc="http://schemas.openxmlformats.org/markup-compatibility/2006">
+        <mc:Choice xmlns:a14="http://schemas.microsoft.com/office/drawing/2010/main" Requires="a14">
+          <p:sp>
+            <p:nvSpPr>
+              <p:cNvPr id="3" name="Content Placeholder 2"/>
+              <p:cNvSpPr>
+                <a:spLocks noGrp="1"/>
+              </p:cNvSpPr>
+              <p:nvPr>
+                <p:ph idx="1"/>
+              </p:nvPr>
+            </p:nvSpPr>
+            <p:spPr/>
+            <p:txBody>
+              <a:bodyPr/>
+              <a:lstStyle/>
+              <a:p>
+                <a:pPr lvl="0"/>
+                <a14:m>
+                  <m:oMath xmlns:m="http://schemas.openxmlformats.org/officeDocument/2006/math">
+                    <m:sSub>
+                      <m:e>
+                        <m:r>
+                          <m:t>H</m:t>
+                        </m:r>
+                      </m:e>
+                      <m:sub>
+                        <m:r>
+                          <m:t>0</m:t>
+                        </m:r>
+                      </m:sub>
+                    </m:sSub>
+                    <m:r>
+                      <m:rPr>
+                        <m:sty m:val="p"/>
+                      </m:rPr>
+                      <m:t>:</m:t>
+                    </m:r>
+                    <m:r>
+                      <m:t> </m:t>
+                    </m:r>
+                    <m:sSub>
+                      <m:e>
+                        <m:r>
+                          <m:t>μ</m:t>
+                        </m:r>
+                      </m:e>
+                      <m:sub>
+                        <m:r>
+                          <m:t>1</m:t>
+                        </m:r>
+                      </m:sub>
+                    </m:sSub>
+                    <m:r>
+                      <m:rPr>
+                        <m:sty m:val="p"/>
+                      </m:rPr>
+                      <m:t>≤</m:t>
+                    </m:r>
+                    <m:sSub>
+                      <m:e>
+                        <m:r>
+                          <m:t>μ</m:t>
+                        </m:r>
+                      </m:e>
+                      <m:sub>
+                        <m:r>
+                          <m:t>2</m:t>
+                        </m:r>
+                      </m:sub>
+                    </m:sSub>
+                  </m:oMath>
+                </a14:m>
+              </a:p>
+              <a:p>
+                <a:pPr lvl="0"/>
+                <a14:m>
+                  <m:oMath xmlns:m="http://schemas.openxmlformats.org/officeDocument/2006/math">
+                    <m:sSub>
+                      <m:e>
+                        <m:r>
+                          <m:t>H</m:t>
+                        </m:r>
+                      </m:e>
+                      <m:sub>
+                        <m:r>
+                          <m:t>1</m:t>
+                        </m:r>
+                      </m:sub>
+                    </m:sSub>
+                    <m:r>
+                      <m:rPr>
+                        <m:sty m:val="p"/>
+                      </m:rPr>
+                      <m:t>:</m:t>
+                    </m:r>
+                    <m:r>
+                      <m:t> </m:t>
+                    </m:r>
+                    <m:sSub>
+                      <m:e>
+                        <m:r>
+                          <m:t>μ</m:t>
+                        </m:r>
+                      </m:e>
+                      <m:sub>
+                        <m:r>
+                          <m:t>1</m:t>
+                        </m:r>
+                      </m:sub>
+                    </m:sSub>
+                    <m:r>
+                      <m:rPr>
+                        <m:sty m:val="p"/>
+                      </m:rPr>
+                      <m:t>&gt;</m:t>
+                    </m:r>
+                    <m:sSub>
+                      <m:e>
+                        <m:r>
+                          <m:t>μ</m:t>
+                        </m:r>
+                      </m:e>
+                      <m:sub>
+                        <m:r>
+                          <m:t>2</m:t>
+                        </m:r>
+                      </m:sub>
+                    </m:sSub>
+                  </m:oMath>
+                </a14:m>
+              </a:p>
+              <a:p>
+                <a:pPr lvl="1"/>
+                <a:r>
+                  <a:rPr/>
+                  <a:t>Assume normal with known </a:t>
+                </a:r>
+                <a14:m>
+                  <m:oMath xmlns:m="http://schemas.openxmlformats.org/officeDocument/2006/math">
+                    <m:r>
+                      <m:t>σ</m:t>
+                    </m:r>
+                  </m:oMath>
+                </a14:m>
+              </a:p>
+              <a:p>
+                <a:pPr lvl="0"/>
+                <a:r>
+                  <a:rPr/>
+                  <a:t>Test statistic</a:t>
+                </a:r>
+              </a:p>
+              <a:p>
+                <a:pPr lvl="1"/>
+                <a14:m>
+                  <m:oMath xmlns:m="http://schemas.openxmlformats.org/officeDocument/2006/math">
+                    <m:r>
+                      <m:t>T</m:t>
+                    </m:r>
+                    <m:r>
+                      <m:rPr>
+                        <m:sty m:val="p"/>
+                      </m:rPr>
+                      <m:t>=</m:t>
+                    </m:r>
+                    <m:f>
+                      <m:fPr>
+                        <m:type m:val="bar"/>
+                      </m:fPr>
+                      <m:num>
+                        <m:sSub>
+                          <m:e>
+                            <m:acc>
+                              <m:accPr>
+                                <m:chr m:val="‾"/>
+                              </m:accPr>
+                              <m:e>
+                                <m:r>
+                                  <m:t>X</m:t>
+                                </m:r>
+                              </m:e>
+                            </m:acc>
+                          </m:e>
+                          <m:sub>
+                            <m:r>
+                              <m:t>1</m:t>
+                            </m:r>
+                          </m:sub>
+                        </m:sSub>
+                        <m:r>
+                          <m:rPr>
+                            <m:sty m:val="p"/>
+                          </m:rPr>
+                          <m:t>−</m:t>
+                        </m:r>
+                        <m:sSub>
+                          <m:e>
+                            <m:acc>
+                              <m:accPr>
+                                <m:chr m:val="‾"/>
+                              </m:accPr>
+                              <m:e>
+                                <m:r>
+                                  <m:t>X</m:t>
+                                </m:r>
+                              </m:e>
+                            </m:acc>
+                          </m:e>
+                          <m:sub>
+                            <m:r>
+                              <m:t>2</m:t>
+                            </m:r>
+                          </m:sub>
+                        </m:sSub>
+                      </m:num>
+                      <m:den>
+                        <m:r>
+                          <m:t>σ</m:t>
+                        </m:r>
+                        <m:rad>
+                          <m:radPr>
+                            <m:degHide m:val="1"/>
+                          </m:radPr>
+                          <m:deg/>
+                          <m:e>
+                            <m:r>
+                              <m:t>1</m:t>
+                            </m:r>
+                            <m:r>
+                              <m:rPr>
+                                <m:sty m:val="p"/>
+                              </m:rPr>
+                              <m:t>/</m:t>
+                            </m:r>
+                            <m:sSub>
+                              <m:e>
+                                <m:r>
+                                  <m:t>n</m:t>
+                                </m:r>
+                              </m:e>
+                              <m:sub>
+                                <m:r>
+                                  <m:t>1</m:t>
+                                </m:r>
+                              </m:sub>
+                            </m:sSub>
+                            <m:r>
+                              <m:rPr>
+                                <m:sty m:val="p"/>
+                              </m:rPr>
+                              <m:t>+</m:t>
+                            </m:r>
+                            <m:r>
+                              <m:t>1</m:t>
+                            </m:r>
+                            <m:r>
+                              <m:rPr>
+                                <m:sty m:val="p"/>
+                              </m:rPr>
+                              <m:t>/</m:t>
+                            </m:r>
+                            <m:sSub>
+                              <m:e>
+                                <m:r>
+                                  <m:t>n</m:t>
+                                </m:r>
+                              </m:e>
+                              <m:sub>
+                                <m:r>
+                                  <m:t>2</m:t>
+                                </m:r>
+                              </m:sub>
+                            </m:sSub>
+                          </m:e>
+                        </m:rad>
+                      </m:den>
+                    </m:f>
+                  </m:oMath>
+                </a14:m>
+              </a:p>
+              <a:p>
+                <a:pPr lvl="1"/>
+                <a:r>
+                  <a:rPr/>
+                  <a:t>Reject </a:t>
+                </a:r>
+                <a14:m>
+                  <m:oMath xmlns:m="http://schemas.openxmlformats.org/officeDocument/2006/math">
+                    <m:sSub>
+                      <m:e>
+                        <m:r>
+                          <m:t>H</m:t>
+                        </m:r>
+                      </m:e>
+                      <m:sub>
+                        <m:r>
+                          <m:t>0</m:t>
+                        </m:r>
+                      </m:sub>
+                    </m:sSub>
+                  </m:oMath>
+                </a14:m>
+                <a:r>
+                  <a:rPr/>
+                  <a:t> if T &gt; </a:t>
+                </a:r>
+                <a14:m>
+                  <m:oMath xmlns:m="http://schemas.openxmlformats.org/officeDocument/2006/math">
+                    <m:sSub>
+                      <m:e>
+                        <m:r>
+                          <m:t>z</m:t>
+                        </m:r>
+                      </m:e>
+                      <m:sub>
+                        <m:r>
+                          <m:t>α</m:t>
+                        </m:r>
+                      </m:sub>
+                    </m:sSub>
+                  </m:oMath>
+                </a14:m>
+              </a:p>
+            </p:txBody>
+          </p:sp>
+        </mc:Choice>
+      </mc:AlternateContent>
+    </p:spTree>
+  </p:cSld>
+</p:sld>
+</file>
+
+<file path=ppt/slides/slide12.xml><?xml version="1.0" encoding="utf-8"?>
+<p:sld xmlns:a="http://schemas.openxmlformats.org/drawingml/2006/main" xmlns:r="http://schemas.openxmlformats.org/officeDocument/2006/relationships" xmlns:p="http://schemas.openxmlformats.org/presentationml/2006/main">
+  <p:cSld>
+    <p:spTree>
+      <p:nvGrpSpPr>
+        <p:cNvPr id="1" name=""/>
+        <p:cNvGrpSpPr/>
+        <p:nvPr/>
+      </p:nvGrpSpPr>
+      <p:grpSpPr>
+        <a:xfrm>
+          <a:off x="0" y="0"/>
+          <a:ext cx="0" cy="0"/>
+          <a:chOff x="0" y="0"/>
+          <a:chExt cx="0" cy="0"/>
+        </a:xfrm>
+      </p:grpSpPr>
+      <p:sp>
+        <p:nvSpPr>
+          <p:cNvPr id="2" name="Title 1"/>
+          <p:cNvSpPr>
+            <a:spLocks noGrp="1"/>
+          </p:cNvSpPr>
+          <p:nvPr>
+            <p:ph type="title"/>
+          </p:nvPr>
+        </p:nvSpPr>
+        <p:spPr/>
+        <p:txBody>
+          <a:bodyPr/>
+          <a:lstStyle/>
+          <a:p>
+            <a:pPr lvl="0" indent="0" marL="0">
+              <a:buNone/>
+            </a:pPr>
+            <a:r>
+              <a:rPr/>
+              <a:t>Approximate sample size for independent samples t-test (1/3)</a:t>
+            </a:r>
+          </a:p>
+        </p:txBody>
+      </p:sp>
+      <mc:AlternateContent xmlns:mc="http://schemas.openxmlformats.org/markup-compatibility/2006">
+        <mc:Choice xmlns:a14="http://schemas.microsoft.com/office/drawing/2010/main" Requires="a14">
+          <p:sp>
+            <p:nvSpPr>
+              <p:cNvPr id="3" name="Content Placeholder 2"/>
+              <p:cNvSpPr>
+                <a:spLocks noGrp="1"/>
+              </p:cNvSpPr>
+              <p:nvPr>
+                <p:ph idx="1"/>
+              </p:nvPr>
+            </p:nvSpPr>
+            <p:spPr/>
+            <p:txBody>
+              <a:bodyPr/>
+              <a:lstStyle/>
+              <a:p>
+                <a:pPr lvl="0"/>
+                <a:r>
+                  <a:rPr/>
+                  <a:t>Approximate formula</a:t>
+                </a:r>
+              </a:p>
+              <a:p>
+                <a:pPr lvl="1"/>
+                <a14:m>
+                  <m:oMath xmlns:m="http://schemas.openxmlformats.org/officeDocument/2006/math">
+                    <m:r>
+                      <m:t>β</m:t>
+                    </m:r>
+                  </m:oMath>
+                </a14:m>
+                <a:r>
+                  <a:rPr/>
+                  <a:t>=1-power</a:t>
+                </a:r>
+              </a:p>
+              <a:p>
+                <a:pPr lvl="1"/>
+                <a14:m>
+                  <m:oMath xmlns:m="http://schemas.openxmlformats.org/officeDocument/2006/math">
+                    <m:r>
+                      <m:t>n</m:t>
+                    </m:r>
+                    <m:r>
+                      <m:rPr>
+                        <m:sty m:val="p"/>
+                      </m:rPr>
+                      <m:t>=</m:t>
+                    </m:r>
+                    <m:f>
+                      <m:fPr>
+                        <m:type m:val="bar"/>
+                      </m:fPr>
+                      <m:num>
+                        <m:r>
+                          <m:t>2</m:t>
+                        </m:r>
+                        <m:sSup>
+                          <m:e>
+                            <m:d>
+                              <m:dPr>
+                                <m:begChr m:val="("/>
+                                <m:endChr m:val=")"/>
+                                <m:sepChr m:val=""/>
+                                <m:grow/>
+                              </m:dPr>
+                              <m:e>
+                                <m:sSub>
+                                  <m:e>
+                                    <m:r>
+                                      <m:t>z</m:t>
+                                    </m:r>
+                                  </m:e>
+                                  <m:sub>
+                                    <m:r>
+                                      <m:t>α</m:t>
+                                    </m:r>
+                                  </m:sub>
+                                </m:sSub>
+                                <m:r>
+                                  <m:rPr>
+                                    <m:sty m:val="p"/>
+                                  </m:rPr>
+                                  <m:t>+</m:t>
+                                </m:r>
+                                <m:sSub>
+                                  <m:e>
+                                    <m:r>
+                                      <m:t>z</m:t>
+                                    </m:r>
+                                  </m:e>
+                                  <m:sub>
+                                    <m:r>
+                                      <m:t>β</m:t>
+                                    </m:r>
+                                  </m:sub>
+                                </m:sSub>
+                              </m:e>
+                            </m:d>
+                          </m:e>
+                          <m:sup>
+                            <m:r>
+                              <m:t>2</m:t>
+                            </m:r>
+                          </m:sup>
+                        </m:sSup>
+                        <m:sSup>
+                          <m:e>
+                            <m:r>
+                              <m:t>σ</m:t>
+                            </m:r>
+                          </m:e>
+                          <m:sup>
+                            <m:r>
+                              <m:t>2</m:t>
+                            </m:r>
+                          </m:sup>
+                        </m:sSup>
+                      </m:num>
+                      <m:den>
+                        <m:sSup>
+                          <m:e>
+                            <m:d>
+                              <m:dPr>
+                                <m:begChr m:val="("/>
+                                <m:endChr m:val=")"/>
+                                <m:sepChr m:val=""/>
+                                <m:grow/>
+                              </m:dPr>
+                              <m:e>
+                                <m:sSub>
+                                  <m:e>
+                                    <m:r>
+                                      <m:t>μ</m:t>
+                                    </m:r>
+                                  </m:e>
+                                  <m:sub>
+                                    <m:r>
+                                      <m:t>1</m:t>
+                                    </m:r>
+                                  </m:sub>
+                                </m:sSub>
+                                <m:r>
+                                  <m:rPr>
+                                    <m:sty m:val="p"/>
+                                  </m:rPr>
+                                  <m:t>−</m:t>
+                                </m:r>
+                                <m:sSub>
+                                  <m:e>
+                                    <m:r>
+                                      <m:t>μ</m:t>
+                                    </m:r>
+                                  </m:e>
+                                  <m:sub>
+                                    <m:r>
+                                      <m:t>2</m:t>
+                                    </m:r>
+                                  </m:sub>
+                                </m:sSub>
+                              </m:e>
+                            </m:d>
+                          </m:e>
+                          <m:sup>
+                            <m:r>
+                              <m:t>2</m:t>
+                            </m:r>
+                          </m:sup>
+                        </m:sSup>
+                      </m:den>
+                    </m:f>
+                  </m:oMath>
+                </a14:m>
+              </a:p>
+              <a:p>
+                <a:pPr lvl="1"/>
+                <a14:m>
+                  <m:oMath xmlns:m="http://schemas.openxmlformats.org/officeDocument/2006/math">
+                    <m:r>
+                      <m:t>n</m:t>
+                    </m:r>
+                    <m:r>
+                      <m:rPr>
+                        <m:sty m:val="p"/>
+                      </m:rPr>
+                      <m:t>=</m:t>
+                    </m:r>
+                    <m:f>
+                      <m:fPr>
+                        <m:type m:val="bar"/>
+                      </m:fPr>
+                      <m:num>
+                        <m:r>
+                          <m:t>2</m:t>
+                        </m:r>
+                        <m:sSup>
+                          <m:e>
+                            <m:d>
+                              <m:dPr>
+                                <m:begChr m:val="("/>
+                                <m:endChr m:val=")"/>
+                                <m:sepChr m:val=""/>
+                                <m:grow/>
+                              </m:dPr>
+                              <m:e>
+                                <m:sSub>
+                                  <m:e>
+                                    <m:r>
+                                      <m:t>z</m:t>
+                                    </m:r>
+                                  </m:e>
+                                  <m:sub>
+                                    <m:r>
+                                      <m:t>α</m:t>
+                                    </m:r>
+                                  </m:sub>
+                                </m:sSub>
+                                <m:r>
+                                  <m:rPr>
+                                    <m:sty m:val="p"/>
+                                  </m:rPr>
+                                  <m:t>+</m:t>
+                                </m:r>
+                                <m:sSub>
+                                  <m:e>
+                                    <m:r>
+                                      <m:t>z</m:t>
+                                    </m:r>
+                                  </m:e>
+                                  <m:sub>
+                                    <m:r>
+                                      <m:t>β</m:t>
+                                    </m:r>
+                                  </m:sub>
+                                </m:sSub>
+                              </m:e>
+                            </m:d>
+                          </m:e>
+                          <m:sup>
+                            <m:r>
+                              <m:t>2</m:t>
+                            </m:r>
+                          </m:sup>
+                        </m:sSup>
+                      </m:num>
+                      <m:den>
+                        <m:r>
+                          <m:t>E</m:t>
+                        </m:r>
+                        <m:sSup>
+                          <m:e>
+                            <m:r>
+                              <m:t>S</m:t>
+                            </m:r>
+                          </m:e>
+                          <m:sup>
+                            <m:r>
+                              <m:t>2</m:t>
+                            </m:r>
+                          </m:sup>
+                        </m:sSup>
+                      </m:den>
+                    </m:f>
+                  </m:oMath>
+                </a14:m>
+              </a:p>
+              <a:p>
+                <a:pPr lvl="0"/>
+                <a:r>
+                  <a:rPr/>
+                  <a:t>Simple modifications for</a:t>
+                </a:r>
+              </a:p>
+              <a:p>
+                <a:pPr lvl="1"/>
+                <a:r>
+                  <a:rPr/>
+                  <a:t>two-sided test</a:t>
+                </a:r>
+              </a:p>
+              <a:p>
+                <a:pPr lvl="1"/>
+                <a:r>
+                  <a:rPr/>
+                  <a:t>unequal group sizes</a:t>
+                </a:r>
+              </a:p>
+              <a:p>
+                <a:pPr lvl="1"/>
+                <a:r>
+                  <a:rPr/>
+                  <a:t>unequal variances</a:t>
+                </a:r>
+              </a:p>
+            </p:txBody>
+          </p:sp>
+        </mc:Choice>
+      </mc:AlternateContent>
+    </p:spTree>
+  </p:cSld>
+</p:sld>
+</file>
+
+<file path=ppt/slides/slide13.xml><?xml version="1.0" encoding="utf-8"?>
+<p:sld xmlns:a="http://schemas.openxmlformats.org/drawingml/2006/main" xmlns:r="http://schemas.openxmlformats.org/officeDocument/2006/relationships" xmlns:p="http://schemas.openxmlformats.org/presentationml/2006/main">
+  <p:cSld>
+    <p:spTree>
+      <p:nvGrpSpPr>
+        <p:cNvPr id="1" name=""/>
+        <p:cNvGrpSpPr/>
+        <p:nvPr/>
+      </p:nvGrpSpPr>
+      <p:grpSpPr>
+        <a:xfrm>
+          <a:off x="0" y="0"/>
+          <a:ext cx="0" cy="0"/>
+          <a:chOff x="0" y="0"/>
+          <a:chExt cx="0" cy="0"/>
+        </a:xfrm>
+      </p:grpSpPr>
+      <p:sp>
+        <p:nvSpPr>
+          <p:cNvPr id="2" name="Title 1"/>
+          <p:cNvSpPr>
+            <a:spLocks noGrp="1"/>
+          </p:cNvSpPr>
+          <p:nvPr>
+            <p:ph type="title"/>
+          </p:nvPr>
+        </p:nvSpPr>
+        <p:spPr/>
+        <p:txBody>
+          <a:bodyPr/>
+          <a:lstStyle/>
+          <a:p>
+            <a:pPr lvl="0" indent="0" marL="0">
+              <a:buNone/>
+            </a:pPr>
+            <a:r>
+              <a:rPr/>
+              <a:t>Approximate sample size for independent samples t-test (2/3)</a:t>
+            </a:r>
+          </a:p>
+        </p:txBody>
+      </p:sp>
+      <mc:AlternateContent xmlns:mc="http://schemas.openxmlformats.org/markup-compatibility/2006">
+        <mc:Choice xmlns:a14="http://schemas.microsoft.com/office/drawing/2010/main" Requires="a14">
+          <p:sp>
+            <p:nvSpPr>
+              <p:cNvPr id="3" name="Content Placeholder 2"/>
+              <p:cNvSpPr>
+                <a:spLocks noGrp="1"/>
+              </p:cNvSpPr>
+              <p:nvPr>
+                <p:ph idx="1"/>
+              </p:nvPr>
+            </p:nvSpPr>
+            <p:spPr/>
+            <p:txBody>
+              <a:bodyPr/>
+              <a:lstStyle/>
+              <a:p>
+                <a:pPr lvl="0"/>
+                <a14:m>
+                  <m:oMath xmlns:m="http://schemas.openxmlformats.org/officeDocument/2006/math">
+                    <m:r>
+                      <m:t>α</m:t>
+                    </m:r>
+                    <m:r>
+                      <m:rPr>
+                        <m:sty m:val="p"/>
+                      </m:rPr>
+                      <m:t>=</m:t>
+                    </m:r>
+                    <m:r>
+                      <m:t>0.025</m:t>
+                    </m:r>
+                  </m:oMath>
+                </a14:m>
+              </a:p>
+              <a:p>
+                <a:pPr lvl="0"/>
+                <a14:m>
+                  <m:oMath xmlns:m="http://schemas.openxmlformats.org/officeDocument/2006/math">
+                    <m:r>
+                      <m:t>β</m:t>
+                    </m:r>
+                    <m:r>
+                      <m:rPr>
+                        <m:sty m:val="p"/>
+                      </m:rPr>
+                      <m:t>=</m:t>
+                    </m:r>
+                    <m:r>
+                      <m:t>0.80</m:t>
+                    </m:r>
+                  </m:oMath>
+                </a14:m>
+              </a:p>
+              <a:p>
+                <a:pPr lvl="1"/>
+                <a14:m>
+                  <m:oMath xmlns:m="http://schemas.openxmlformats.org/officeDocument/2006/math">
+                    <m:r>
+                      <m:t>n</m:t>
+                    </m:r>
+                    <m:r>
+                      <m:rPr>
+                        <m:sty m:val="p"/>
+                      </m:rPr>
+                      <m:t>=</m:t>
+                    </m:r>
+                    <m:f>
+                      <m:fPr>
+                        <m:type m:val="bar"/>
+                      </m:fPr>
+                      <m:num>
+                        <m:r>
+                          <m:t>2</m:t>
+                        </m:r>
+                        <m:sSup>
+                          <m:e>
+                            <m:d>
+                              <m:dPr>
+                                <m:begChr m:val="("/>
+                                <m:endChr m:val=")"/>
+                                <m:sepChr m:val=""/>
+                                <m:grow/>
+                              </m:dPr>
+                              <m:e>
+                                <m:r>
+                                  <m:t>1.96</m:t>
+                                </m:r>
+                                <m:r>
+                                  <m:rPr>
+                                    <m:sty m:val="p"/>
+                                  </m:rPr>
+                                  <m:t>+</m:t>
+                                </m:r>
+                                <m:r>
+                                  <m:t>0.84</m:t>
+                                </m:r>
+                              </m:e>
+                            </m:d>
+                          </m:e>
+                          <m:sup>
+                            <m:r>
+                              <m:t>2</m:t>
+                            </m:r>
+                          </m:sup>
+                        </m:sSup>
+                      </m:num>
+                      <m:den>
+                        <m:r>
+                          <m:t>E</m:t>
+                        </m:r>
+                        <m:sSup>
+                          <m:e>
+                            <m:r>
+                              <m:t>S</m:t>
+                            </m:r>
+                          </m:e>
+                          <m:sup>
+                            <m:r>
+                              <m:t>2</m:t>
+                            </m:r>
+                          </m:sup>
+                        </m:sSup>
+                      </m:den>
+                    </m:f>
+                  </m:oMath>
+                </a14:m>
+              </a:p>
+              <a:p>
+                <a:pPr lvl="1"/>
+                <a14:m>
+                  <m:oMath xmlns:m="http://schemas.openxmlformats.org/officeDocument/2006/math">
+                    <m:r>
+                      <m:t>n</m:t>
+                    </m:r>
+                    <m:r>
+                      <m:rPr>
+                        <m:sty m:val="p"/>
+                      </m:rPr>
+                      <m:t>=</m:t>
+                    </m:r>
+                    <m:f>
+                      <m:fPr>
+                        <m:type m:val="bar"/>
+                      </m:fPr>
+                      <m:num>
+                        <m:r>
+                          <m:t>15.84</m:t>
+                        </m:r>
+                      </m:num>
+                      <m:den>
+                        <m:r>
+                          <m:t>E</m:t>
+                        </m:r>
+                        <m:sSup>
+                          <m:e>
+                            <m:r>
+                              <m:t>S</m:t>
+                            </m:r>
+                          </m:e>
+                          <m:sup>
+                            <m:r>
+                              <m:t>2</m:t>
+                            </m:r>
+                          </m:sup>
+                        </m:sSup>
+                      </m:den>
+                    </m:f>
+                  </m:oMath>
+                </a14:m>
+              </a:p>
+              <a:p>
+                <a:pPr lvl="1"/>
+                <a14:m>
+                  <m:oMath xmlns:m="http://schemas.openxmlformats.org/officeDocument/2006/math">
+                    <m:r>
+                      <m:t>n</m:t>
+                    </m:r>
+                    <m:r>
+                      <m:rPr>
+                        <m:sty m:val="p"/>
+                      </m:rPr>
+                      <m:t>≈</m:t>
+                    </m:r>
+                    <m:f>
+                      <m:fPr>
+                        <m:type m:val="bar"/>
+                      </m:fPr>
+                      <m:num>
+                        <m:r>
+                          <m:t>16</m:t>
+                        </m:r>
+                      </m:num>
+                      <m:den>
+                        <m:r>
+                          <m:t>E</m:t>
+                        </m:r>
+                        <m:sSup>
+                          <m:e>
+                            <m:r>
+                              <m:t>S</m:t>
+                            </m:r>
+                          </m:e>
+                          <m:sup>
+                            <m:r>
+                              <m:t>2</m:t>
+                            </m:r>
+                          </m:sup>
+                        </m:sSup>
+                      </m:den>
+                    </m:f>
+                  </m:oMath>
+                </a14:m>
+              </a:p>
+            </p:txBody>
+          </p:sp>
+        </mc:Choice>
+      </mc:AlternateContent>
+    </p:spTree>
+  </p:cSld>
+</p:sld>
+</file>
+
+<file path=ppt/slides/slide14.xml><?xml version="1.0" encoding="utf-8"?>
+<p:sld xmlns:a="http://schemas.openxmlformats.org/drawingml/2006/main" xmlns:r="http://schemas.openxmlformats.org/officeDocument/2006/relationships" xmlns:p="http://schemas.openxmlformats.org/presentationml/2006/main">
+  <p:cSld>
+    <p:spTree>
+      <p:nvGrpSpPr>
+        <p:cNvPr id="1" name=""/>
+        <p:cNvGrpSpPr/>
+        <p:nvPr/>
+      </p:nvGrpSpPr>
+      <p:grpSpPr>
+        <a:xfrm>
+          <a:off x="0" y="0"/>
+          <a:ext cx="0" cy="0"/>
+          <a:chOff x="0" y="0"/>
+          <a:chExt cx="0" cy="0"/>
+        </a:xfrm>
+      </p:grpSpPr>
+      <p:sp>
+        <p:nvSpPr>
+          <p:cNvPr id="2" name="Title 1"/>
+          <p:cNvSpPr>
+            <a:spLocks noGrp="1"/>
+          </p:cNvSpPr>
+          <p:nvPr>
+            <p:ph type="title"/>
+          </p:nvPr>
+        </p:nvSpPr>
+        <p:spPr/>
+        <p:txBody>
+          <a:bodyPr/>
+          <a:lstStyle/>
+          <a:p>
+            <a:pPr lvl="0" indent="0" marL="0">
+              <a:buNone/>
+            </a:pPr>
+            <a:r>
+              <a:rPr/>
+              <a:t>Approximate sample size for independent samples t-test (3/3)</a:t>
+            </a:r>
+          </a:p>
+        </p:txBody>
+      </p:sp>
+      <p:sp>
+        <p:nvSpPr>
+          <p:cNvPr id="3" name="Content Placeholder 2"/>
+          <p:cNvSpPr>
+            <a:spLocks noGrp="1"/>
+          </p:cNvSpPr>
+          <p:nvPr>
+            <p:ph idx="1"/>
+          </p:nvPr>
+        </p:nvSpPr>
+        <p:spPr/>
+        <p:txBody>
+          <a:bodyPr/>
+          <a:lstStyle/>
+          <a:p>
+            <a:pPr lvl="0" indent="0">
+              <a:buNone/>
+            </a:pPr>
+            <a:r>
+              <a:rPr>
+                <a:latin typeface="Courier"/>
+              </a:rPr>
+              <a:t>alpha </a:t>
+            </a:r>
+            <a:r>
+              <a:rPr>
+                <a:solidFill>
+                  <a:srgbClr val="007020"/>
+                </a:solidFill>
+                <a:latin typeface="Courier"/>
+              </a:rPr>
+              <a:t>&lt;-</a:t>
+            </a:r>
+            <a:r>
+              <a:rPr>
+                <a:latin typeface="Courier"/>
+              </a:rPr>
+              <a:t> </a:t>
+            </a:r>
+            <a:r>
+              <a:rPr>
+                <a:solidFill>
+                  <a:srgbClr val="40A070"/>
+                </a:solidFill>
+                <a:latin typeface="Courier"/>
+              </a:rPr>
+              <a:t>0.025</a:t>
+            </a:r>
+            <a:br/>
+            <a:r>
+              <a:rPr>
+                <a:latin typeface="Courier"/>
+              </a:rPr>
+              <a:t>beta </a:t>
+            </a:r>
+            <a:r>
+              <a:rPr>
+                <a:solidFill>
+                  <a:srgbClr val="007020"/>
+                </a:solidFill>
+                <a:latin typeface="Courier"/>
+              </a:rPr>
+              <a:t>&lt;-</a:t>
+            </a:r>
+            <a:r>
+              <a:rPr>
+                <a:latin typeface="Courier"/>
+              </a:rPr>
+              <a:t> </a:t>
+            </a:r>
+            <a:r>
+              <a:rPr>
+                <a:solidFill>
+                  <a:srgbClr val="40A070"/>
+                </a:solidFill>
+                <a:latin typeface="Courier"/>
+              </a:rPr>
+              <a:t>0.20</a:t>
+            </a:r>
+            <a:br/>
+            <a:r>
+              <a:rPr>
+                <a:latin typeface="Courier"/>
+              </a:rPr>
+              <a:t>delta </a:t>
+            </a:r>
+            <a:r>
+              <a:rPr>
+                <a:solidFill>
+                  <a:srgbClr val="007020"/>
+                </a:solidFill>
+                <a:latin typeface="Courier"/>
+              </a:rPr>
+              <a:t>&lt;-</a:t>
+            </a:r>
+            <a:r>
+              <a:rPr>
+                <a:latin typeface="Courier"/>
+              </a:rPr>
+              <a:t> </a:t>
+            </a:r>
+            <a:r>
+              <a:rPr>
+                <a:solidFill>
+                  <a:srgbClr val="40A070"/>
+                </a:solidFill>
+                <a:latin typeface="Courier"/>
+              </a:rPr>
+              <a:t>20</a:t>
+            </a:r>
+            <a:br/>
+            <a:r>
+              <a:rPr>
+                <a:latin typeface="Courier"/>
+              </a:rPr>
+              <a:t>sigma </a:t>
+            </a:r>
+            <a:r>
+              <a:rPr>
+                <a:solidFill>
+                  <a:srgbClr val="007020"/>
+                </a:solidFill>
+                <a:latin typeface="Courier"/>
+              </a:rPr>
+              <a:t>&lt;-</a:t>
+            </a:r>
+            <a:r>
+              <a:rPr>
+                <a:latin typeface="Courier"/>
+              </a:rPr>
+              <a:t> </a:t>
+            </a:r>
+            <a:r>
+              <a:rPr>
+                <a:solidFill>
+                  <a:srgbClr val="40A070"/>
+                </a:solidFill>
+                <a:latin typeface="Courier"/>
+              </a:rPr>
+              <a:t>40</a:t>
+            </a:r>
+            <a:br/>
+            <a:r>
+              <a:rPr>
+                <a:latin typeface="Courier"/>
+              </a:rPr>
+              <a:t>ES </a:t>
+            </a:r>
+            <a:r>
+              <a:rPr>
+                <a:solidFill>
+                  <a:srgbClr val="007020"/>
+                </a:solidFill>
+                <a:latin typeface="Courier"/>
+              </a:rPr>
+              <a:t>&lt;-</a:t>
+            </a:r>
+            <a:r>
+              <a:rPr>
+                <a:latin typeface="Courier"/>
+              </a:rPr>
+              <a:t> delta</a:t>
+            </a:r>
+            <a:r>
+              <a:rPr>
+                <a:solidFill>
+                  <a:srgbClr val="4070A0"/>
+                </a:solidFill>
+                <a:latin typeface="Courier"/>
+              </a:rPr>
+              <a:t>/</a:t>
+            </a:r>
+            <a:r>
+              <a:rPr>
+                <a:latin typeface="Courier"/>
+              </a:rPr>
+              <a:t>sigma</a:t>
+            </a:r>
+            <a:br/>
+            <a:r>
+              <a:rPr>
+                <a:solidFill>
+                  <a:srgbClr val="40A070"/>
+                </a:solidFill>
+                <a:latin typeface="Courier"/>
+              </a:rPr>
+              <a:t>2</a:t>
+            </a:r>
+            <a:r>
+              <a:rPr>
+                <a:solidFill>
+                  <a:srgbClr val="4070A0"/>
+                </a:solidFill>
+                <a:latin typeface="Courier"/>
+              </a:rPr>
+              <a:t>*</a:t>
+            </a:r>
+            <a:r>
+              <a:rPr>
+                <a:latin typeface="Courier"/>
+              </a:rPr>
+              <a:t>(</a:t>
+            </a:r>
+            <a:r>
+              <a:rPr>
+                <a:solidFill>
+                  <a:srgbClr val="06287E"/>
+                </a:solidFill>
+                <a:latin typeface="Courier"/>
+              </a:rPr>
+              <a:t>qnorm</a:t>
+            </a:r>
+            <a:r>
+              <a:rPr>
+                <a:latin typeface="Courier"/>
+              </a:rPr>
+              <a:t>(</a:t>
+            </a:r>
+            <a:r>
+              <a:rPr>
+                <a:solidFill>
+                  <a:srgbClr val="40A070"/>
+                </a:solidFill>
+                <a:latin typeface="Courier"/>
+              </a:rPr>
+              <a:t>1</a:t>
+            </a:r>
+            <a:r>
+              <a:rPr>
+                <a:solidFill>
+                  <a:srgbClr val="4070A0"/>
+                </a:solidFill>
+                <a:latin typeface="Courier"/>
+              </a:rPr>
+              <a:t>-</a:t>
+            </a:r>
+            <a:r>
+              <a:rPr>
+                <a:latin typeface="Courier"/>
+              </a:rPr>
+              <a:t>alpha)</a:t>
+            </a:r>
+            <a:r>
+              <a:rPr>
+                <a:solidFill>
+                  <a:srgbClr val="4070A0"/>
+                </a:solidFill>
+                <a:latin typeface="Courier"/>
+              </a:rPr>
+              <a:t>+</a:t>
+            </a:r>
+            <a:r>
+              <a:rPr>
+                <a:solidFill>
+                  <a:srgbClr val="06287E"/>
+                </a:solidFill>
+                <a:latin typeface="Courier"/>
+              </a:rPr>
+              <a:t>qnorm</a:t>
+            </a:r>
+            <a:r>
+              <a:rPr>
+                <a:latin typeface="Courier"/>
+              </a:rPr>
+              <a:t>(</a:t>
+            </a:r>
+            <a:r>
+              <a:rPr>
+                <a:solidFill>
+                  <a:srgbClr val="40A070"/>
+                </a:solidFill>
+                <a:latin typeface="Courier"/>
+              </a:rPr>
+              <a:t>1</a:t>
+            </a:r>
+            <a:r>
+              <a:rPr>
+                <a:solidFill>
+                  <a:srgbClr val="4070A0"/>
+                </a:solidFill>
+                <a:latin typeface="Courier"/>
+              </a:rPr>
+              <a:t>-</a:t>
+            </a:r>
+            <a:r>
+              <a:rPr>
+                <a:latin typeface="Courier"/>
+              </a:rPr>
+              <a:t>beta))</a:t>
+            </a:r>
+            <a:r>
+              <a:rPr>
+                <a:solidFill>
+                  <a:srgbClr val="4070A0"/>
+                </a:solidFill>
+                <a:latin typeface="Courier"/>
+              </a:rPr>
+              <a:t>^</a:t>
+            </a:r>
+            <a:r>
+              <a:rPr>
+                <a:solidFill>
+                  <a:srgbClr val="40A070"/>
+                </a:solidFill>
+                <a:latin typeface="Courier"/>
+              </a:rPr>
+              <a:t>2</a:t>
+            </a:r>
+            <a:r>
+              <a:rPr>
+                <a:solidFill>
+                  <a:srgbClr val="4070A0"/>
+                </a:solidFill>
+                <a:latin typeface="Courier"/>
+              </a:rPr>
+              <a:t>/</a:t>
+            </a:r>
+            <a:r>
+              <a:rPr>
+                <a:latin typeface="Courier"/>
+              </a:rPr>
+              <a:t>ES</a:t>
+            </a:r>
+            <a:r>
+              <a:rPr>
+                <a:solidFill>
+                  <a:srgbClr val="4070A0"/>
+                </a:solidFill>
+                <a:latin typeface="Courier"/>
+              </a:rPr>
+              <a:t>^</a:t>
+            </a:r>
+            <a:r>
+              <a:rPr>
+                <a:solidFill>
+                  <a:srgbClr val="40A070"/>
+                </a:solidFill>
+                <a:latin typeface="Courier"/>
+              </a:rPr>
+              <a:t>2</a:t>
+            </a:r>
+          </a:p>
+          <a:p>
+            <a:pPr lvl="0" indent="0">
+              <a:buNone/>
+            </a:pPr>
+            <a:r>
+              <a:rPr>
+                <a:latin typeface="Courier"/>
+              </a:rPr>
+              <a:t>## [1] 62.79104</a:t>
+            </a:r>
+          </a:p>
+        </p:txBody>
+      </p:sp>
+    </p:spTree>
+  </p:cSld>
+</p:sld>
+</file>
+
+<file path=ppt/slides/slide15.xml><?xml version="1.0" encoding="utf-8"?>
+<p:sld xmlns:a="http://schemas.openxmlformats.org/drawingml/2006/main" xmlns:r="http://schemas.openxmlformats.org/officeDocument/2006/relationships" xmlns:p="http://schemas.openxmlformats.org/presentationml/2006/main">
+  <p:cSld>
+    <p:spTree>
+      <p:nvGrpSpPr>
+        <p:cNvPr id="1" name=""/>
+        <p:cNvGrpSpPr/>
+        <p:nvPr/>
+      </p:nvGrpSpPr>
+      <p:grpSpPr>
+        <a:xfrm>
+          <a:off x="0" y="0"/>
+          <a:ext cx="0" cy="0"/>
+          <a:chOff x="0" y="0"/>
+          <a:chExt cx="0" cy="0"/>
+        </a:xfrm>
+      </p:grpSpPr>
+      <p:sp>
+        <p:nvSpPr>
+          <p:cNvPr id="2" name="Title 1"/>
+          <p:cNvSpPr>
+            <a:spLocks noGrp="1"/>
+          </p:cNvSpPr>
+          <p:nvPr>
+            <p:ph type="title"/>
+          </p:nvPr>
+        </p:nvSpPr>
+        <p:spPr/>
+        <p:txBody>
+          <a:bodyPr/>
+          <a:lstStyle/>
+          <a:p>
+            <a:pPr lvl="0" indent="0" marL="0">
+              <a:buNone/>
+            </a:pPr>
+            <a:r>
+              <a:rPr/>
+              <a:t>Power for independent samples t-test (1/2)</a:t>
+            </a:r>
+          </a:p>
+        </p:txBody>
+      </p:sp>
+      <mc:AlternateContent xmlns:mc="http://schemas.openxmlformats.org/markup-compatibility/2006">
+        <mc:Choice xmlns:a14="http://schemas.microsoft.com/office/drawing/2010/main" Requires="a14">
+          <p:sp>
+            <p:nvSpPr>
+              <p:cNvPr id="3" name="Content Placeholder 2"/>
+              <p:cNvSpPr>
+                <a:spLocks noGrp="1"/>
+              </p:cNvSpPr>
+              <p:nvPr>
+                <p:ph idx="1"/>
+              </p:nvPr>
+            </p:nvSpPr>
+            <p:spPr/>
+            <p:txBody>
+              <a:bodyPr/>
+              <a:lstStyle/>
+              <a:p>
+                <a:pPr lvl="0"/>
+                <a:r>
+                  <a:rPr/>
+                  <a:t>Use non-central t distribution</a:t>
+                </a:r>
+              </a:p>
+              <a:p>
+                <a:pPr lvl="1"/>
+                <a:r>
+                  <a:rPr/>
+                  <a:t>ncp = </a:t>
+                </a:r>
+                <a14:m>
+                  <m:oMath xmlns:m="http://schemas.openxmlformats.org/officeDocument/2006/math">
+                    <m:r>
+                      <m:t>E</m:t>
+                    </m:r>
+                    <m:r>
+                      <m:t>S</m:t>
+                    </m:r>
+                    <m:r>
+                      <m:t> </m:t>
+                    </m:r>
+                    <m:rad>
+                      <m:radPr>
+                        <m:degHide m:val="1"/>
+                      </m:radPr>
+                      <m:deg/>
+                      <m:e>
+                        <m:r>
+                          <m:t>n</m:t>
+                        </m:r>
+                        <m:r>
+                          <m:rPr>
+                            <m:sty m:val="p"/>
+                          </m:rPr>
+                          <m:t>/</m:t>
+                        </m:r>
+                        <m:r>
+                          <m:t>2</m:t>
+                        </m:r>
+                      </m:e>
+                    </m:rad>
+                  </m:oMath>
+                </a14:m>
+              </a:p>
+              <a:p>
+                <a:pPr lvl="0"/>
+                <a:r>
+                  <a:rPr/>
+                  <a:t>Power = P[non-central t &gt; </a:t>
+                </a:r>
+                <a14:m>
+                  <m:oMath xmlns:m="http://schemas.openxmlformats.org/officeDocument/2006/math">
+                    <m:sSub>
+                      <m:e>
+                        <m:r>
+                          <m:t>z</m:t>
+                        </m:r>
+                      </m:e>
+                      <m:sub>
+                        <m:r>
+                          <m:t>α</m:t>
+                        </m:r>
+                      </m:sub>
+                    </m:sSub>
+                  </m:oMath>
+                </a14:m>
+                <a:r>
+                  <a:rPr/>
+                  <a:t>]</a:t>
+                </a:r>
+              </a:p>
+            </p:txBody>
+          </p:sp>
+        </mc:Choice>
+      </mc:AlternateContent>
+    </p:spTree>
+  </p:cSld>
+</p:sld>
+</file>
+
+<file path=ppt/slides/slide16.xml><?xml version="1.0" encoding="utf-8"?>
+<p:sld xmlns:a="http://schemas.openxmlformats.org/drawingml/2006/main" xmlns:r="http://schemas.openxmlformats.org/officeDocument/2006/relationships" xmlns:p="http://schemas.openxmlformats.org/presentationml/2006/main">
+  <p:cSld>
+    <p:spTree>
+      <p:nvGrpSpPr>
+        <p:cNvPr id="1" name=""/>
+        <p:cNvGrpSpPr/>
+        <p:nvPr/>
+      </p:nvGrpSpPr>
+      <p:grpSpPr>
+        <a:xfrm>
+          <a:off x="0" y="0"/>
+          <a:ext cx="0" cy="0"/>
+          <a:chOff x="0" y="0"/>
+          <a:chExt cx="0" cy="0"/>
+        </a:xfrm>
+      </p:grpSpPr>
+      <p:sp>
+        <p:nvSpPr>
+          <p:cNvPr id="2" name="Title 1"/>
+          <p:cNvSpPr>
+            <a:spLocks noGrp="1"/>
+          </p:cNvSpPr>
+          <p:nvPr>
+            <p:ph type="title"/>
+          </p:nvPr>
+        </p:nvSpPr>
+        <p:spPr/>
+        <p:txBody>
+          <a:bodyPr/>
+          <a:lstStyle/>
+          <a:p>
+            <a:pPr lvl="0" indent="0" marL="0">
+              <a:buNone/>
+            </a:pPr>
+            <a:r>
+              <a:rPr/>
+              <a:t>Test</a:t>
+            </a:r>
+          </a:p>
+        </p:txBody>
+      </p:sp>
+      <p:sp>
+        <p:nvSpPr>
+          <p:cNvPr id="3" name="Content Placeholder 2"/>
+          <p:cNvSpPr>
+            <a:spLocks noGrp="1"/>
+          </p:cNvSpPr>
+          <p:nvPr>
+            <p:ph idx="1"/>
+          </p:nvPr>
+        </p:nvSpPr>
+        <p:spPr/>
+        <p:txBody>
+          <a:bodyPr/>
+          <a:lstStyle/>
+          <a:p>
+            <a:pPr lvl="0" indent="0">
+              <a:buNone/>
+            </a:pPr>
+            <a:r>
+              <a:rPr>
+                <a:latin typeface="Courier"/>
+              </a:rPr>
+              <a:t>n </a:t>
+            </a:r>
+            <a:r>
+              <a:rPr>
+                <a:solidFill>
+                  <a:srgbClr val="007020"/>
+                </a:solidFill>
+                <a:latin typeface="Courier"/>
+              </a:rPr>
+              <a:t>&lt;-</a:t>
+            </a:r>
+            <a:r>
+              <a:rPr>
+                <a:latin typeface="Courier"/>
+              </a:rPr>
+              <a:t> </a:t>
+            </a:r>
+            <a:r>
+              <a:rPr>
+                <a:solidFill>
+                  <a:srgbClr val="40A070"/>
+                </a:solidFill>
+                <a:latin typeface="Courier"/>
+              </a:rPr>
+              <a:t>64</a:t>
+            </a:r>
+            <a:br/>
+            <a:r>
+              <a:rPr>
+                <a:solidFill>
+                  <a:srgbClr val="40A070"/>
+                </a:solidFill>
+                <a:latin typeface="Courier"/>
+              </a:rPr>
+              <a:t>1</a:t>
+            </a:r>
+            <a:r>
+              <a:rPr>
+                <a:solidFill>
+                  <a:srgbClr val="4070A0"/>
+                </a:solidFill>
+                <a:latin typeface="Courier"/>
+              </a:rPr>
+              <a:t>-</a:t>
+            </a:r>
+            <a:r>
+              <a:rPr>
+                <a:solidFill>
+                  <a:srgbClr val="06287E"/>
+                </a:solidFill>
+                <a:latin typeface="Courier"/>
+              </a:rPr>
+              <a:t>pt</a:t>
+            </a:r>
+            <a:r>
+              <a:rPr>
+                <a:latin typeface="Courier"/>
+              </a:rPr>
+              <a:t>(</a:t>
+            </a:r>
+            <a:br/>
+            <a:r>
+              <a:rPr>
+                <a:latin typeface="Courier"/>
+              </a:rPr>
+              <a:t>  </a:t>
+            </a:r>
+            <a:r>
+              <a:rPr>
+                <a:solidFill>
+                  <a:srgbClr val="06287E"/>
+                </a:solidFill>
+                <a:latin typeface="Courier"/>
+              </a:rPr>
+              <a:t>qnorm</a:t>
+            </a:r>
+            <a:r>
+              <a:rPr>
+                <a:latin typeface="Courier"/>
+              </a:rPr>
+              <a:t>(</a:t>
+            </a:r>
+            <a:r>
+              <a:rPr>
+                <a:solidFill>
+                  <a:srgbClr val="40A070"/>
+                </a:solidFill>
+                <a:latin typeface="Courier"/>
+              </a:rPr>
+              <a:t>1</a:t>
+            </a:r>
+            <a:r>
+              <a:rPr>
+                <a:solidFill>
+                  <a:srgbClr val="4070A0"/>
+                </a:solidFill>
+                <a:latin typeface="Courier"/>
+              </a:rPr>
+              <a:t>-</a:t>
+            </a:r>
+            <a:r>
+              <a:rPr>
+                <a:latin typeface="Courier"/>
+              </a:rPr>
+              <a:t>alpha), </a:t>
+            </a:r>
+            <a:br/>
+            <a:r>
+              <a:rPr>
+                <a:latin typeface="Courier"/>
+              </a:rPr>
+              <a:t>  </a:t>
+            </a:r>
+            <a:r>
+              <a:rPr>
+                <a:solidFill>
+                  <a:srgbClr val="7D9029"/>
+                </a:solidFill>
+                <a:latin typeface="Courier"/>
+              </a:rPr>
+              <a:t>df=</a:t>
+            </a:r>
+            <a:r>
+              <a:rPr>
+                <a:solidFill>
+                  <a:srgbClr val="40A070"/>
+                </a:solidFill>
+                <a:latin typeface="Courier"/>
+              </a:rPr>
+              <a:t>126</a:t>
+            </a:r>
+            <a:r>
+              <a:rPr>
+                <a:latin typeface="Courier"/>
+              </a:rPr>
+              <a:t>, </a:t>
+            </a:r>
+            <a:br/>
+            <a:r>
+              <a:rPr>
+                <a:latin typeface="Courier"/>
+              </a:rPr>
+              <a:t>  </a:t>
+            </a:r>
+            <a:r>
+              <a:rPr>
+                <a:solidFill>
+                  <a:srgbClr val="7D9029"/>
+                </a:solidFill>
+                <a:latin typeface="Courier"/>
+              </a:rPr>
+              <a:t>ncp=</a:t>
+            </a:r>
+            <a:r>
+              <a:rPr>
+                <a:latin typeface="Courier"/>
+              </a:rPr>
+              <a:t>ES</a:t>
+            </a:r>
+            <a:r>
+              <a:rPr>
+                <a:solidFill>
+                  <a:srgbClr val="4070A0"/>
+                </a:solidFill>
+                <a:latin typeface="Courier"/>
+              </a:rPr>
+              <a:t>*</a:t>
+            </a:r>
+            <a:r>
+              <a:rPr>
+                <a:solidFill>
+                  <a:srgbClr val="06287E"/>
+                </a:solidFill>
+                <a:latin typeface="Courier"/>
+              </a:rPr>
+              <a:t>sqrt</a:t>
+            </a:r>
+            <a:r>
+              <a:rPr>
+                <a:latin typeface="Courier"/>
+              </a:rPr>
+              <a:t>(n</a:t>
+            </a:r>
+            <a:r>
+              <a:rPr>
+                <a:solidFill>
+                  <a:srgbClr val="4070A0"/>
+                </a:solidFill>
+                <a:latin typeface="Courier"/>
+              </a:rPr>
+              <a:t>/</a:t>
+            </a:r>
+            <a:r>
+              <a:rPr>
+                <a:solidFill>
+                  <a:srgbClr val="40A070"/>
+                </a:solidFill>
+                <a:latin typeface="Courier"/>
+              </a:rPr>
+              <a:t>2</a:t>
+            </a:r>
+            <a:r>
+              <a:rPr>
+                <a:latin typeface="Courier"/>
+              </a:rPr>
+              <a:t>))</a:t>
+            </a:r>
+          </a:p>
+          <a:p>
+            <a:pPr lvl="0" indent="0">
+              <a:buNone/>
+            </a:pPr>
+            <a:r>
+              <a:rPr>
+                <a:latin typeface="Courier"/>
+              </a:rPr>
+              <a:t>## [1] 0.8066979</a:t>
+            </a:r>
+          </a:p>
+        </p:txBody>
+      </p:sp>
+    </p:spTree>
+  </p:cSld>
+</p:sld>
+</file>
+
+<file path=ppt/slides/slide17.xml><?xml version="1.0" encoding="utf-8"?>
+<p:sld xmlns:a="http://schemas.openxmlformats.org/drawingml/2006/main" xmlns:r="http://schemas.openxmlformats.org/officeDocument/2006/relationships" xmlns:p="http://schemas.openxmlformats.org/presentationml/2006/main">
+  <p:cSld>
+    <p:spTree>
+      <p:nvGrpSpPr>
+        <p:cNvPr id="1" name=""/>
+        <p:cNvGrpSpPr/>
+        <p:nvPr/>
+      </p:nvGrpSpPr>
+      <p:grpSpPr>
+        <a:xfrm>
+          <a:off x="0" y="0"/>
+          <a:ext cx="0" cy="0"/>
+          <a:chOff x="0" y="0"/>
+          <a:chExt cx="0" cy="0"/>
+        </a:xfrm>
+      </p:grpSpPr>
+      <p:sp>
+        <p:nvSpPr>
+          <p:cNvPr id="2" name="Title 1"/>
+          <p:cNvSpPr>
+            <a:spLocks noGrp="1"/>
+          </p:cNvSpPr>
+          <p:nvPr>
+            <p:ph type="title"/>
+          </p:nvPr>
+        </p:nvSpPr>
+        <p:spPr/>
+        <p:txBody>
+          <a:bodyPr/>
+          <a:lstStyle/>
+          <a:p>
+            <a:pPr lvl="0" indent="0" marL="0">
+              <a:buNone/>
+            </a:pPr>
+            <a:r>
+              <a:rPr/>
+              <a:t>Power for independent samples t-test (2/2)</a:t>
+            </a:r>
+          </a:p>
+        </p:txBody>
+      </p:sp>
+      <p:sp>
+        <p:nvSpPr>
+          <p:cNvPr id="3" name="Content Placeholder 2"/>
+          <p:cNvSpPr>
+            <a:spLocks noGrp="1"/>
+          </p:cNvSpPr>
+          <p:nvPr>
+            <p:ph idx="1"/>
+          </p:nvPr>
+        </p:nvSpPr>
+        <p:spPr/>
+        <p:txBody>
+          <a:bodyPr/>
+          <a:lstStyle/>
+          <a:p>
+            <a:pPr lvl="0" indent="0">
+              <a:buNone/>
+            </a:pPr>
+            <a:r>
+              <a:rPr>
+                <a:solidFill>
+                  <a:srgbClr val="40A070"/>
+                </a:solidFill>
+                <a:latin typeface="Courier"/>
+              </a:rPr>
+              <a:t>1</a:t>
+            </a:r>
+            <a:r>
+              <a:rPr>
+                <a:solidFill>
+                  <a:srgbClr val="4070A0"/>
+                </a:solidFill>
+                <a:latin typeface="Courier"/>
+              </a:rPr>
+              <a:t>-</a:t>
+            </a:r>
+            <a:r>
+              <a:rPr>
+                <a:solidFill>
+                  <a:srgbClr val="06287E"/>
+                </a:solidFill>
+                <a:latin typeface="Courier"/>
+              </a:rPr>
+              <a:t>pt</a:t>
+            </a:r>
+            <a:r>
+              <a:rPr>
+                <a:latin typeface="Courier"/>
+              </a:rPr>
+              <a:t>(</a:t>
+            </a:r>
+            <a:r>
+              <a:rPr>
+                <a:solidFill>
+                  <a:srgbClr val="06287E"/>
+                </a:solidFill>
+                <a:latin typeface="Courier"/>
+              </a:rPr>
+              <a:t>qnorm</a:t>
+            </a:r>
+            <a:r>
+              <a:rPr>
+                <a:latin typeface="Courier"/>
+              </a:rPr>
+              <a:t>(</a:t>
+            </a:r>
+            <a:r>
+              <a:rPr>
+                <a:solidFill>
+                  <a:srgbClr val="40A070"/>
+                </a:solidFill>
+                <a:latin typeface="Courier"/>
+              </a:rPr>
+              <a:t>1</a:t>
+            </a:r>
+            <a:r>
+              <a:rPr>
+                <a:solidFill>
+                  <a:srgbClr val="4070A0"/>
+                </a:solidFill>
+                <a:latin typeface="Courier"/>
+              </a:rPr>
+              <a:t>-</a:t>
+            </a:r>
+            <a:r>
+              <a:rPr>
+                <a:latin typeface="Courier"/>
+              </a:rPr>
+              <a:t>alpha), </a:t>
+            </a:r>
+            <a:r>
+              <a:rPr>
+                <a:solidFill>
+                  <a:srgbClr val="7D9029"/>
+                </a:solidFill>
+                <a:latin typeface="Courier"/>
+              </a:rPr>
+              <a:t>df=</a:t>
+            </a:r>
+            <a:r>
+              <a:rPr>
+                <a:solidFill>
+                  <a:srgbClr val="40A070"/>
+                </a:solidFill>
+                <a:latin typeface="Courier"/>
+              </a:rPr>
+              <a:t>62</a:t>
+            </a:r>
+            <a:r>
+              <a:rPr>
+                <a:latin typeface="Courier"/>
+              </a:rPr>
+              <a:t>, </a:t>
+            </a:r>
+            <a:r>
+              <a:rPr>
+                <a:solidFill>
+                  <a:srgbClr val="7D9029"/>
+                </a:solidFill>
+                <a:latin typeface="Courier"/>
+              </a:rPr>
+              <a:t>ncp=</a:t>
+            </a:r>
+            <a:r>
+              <a:rPr>
+                <a:solidFill>
+                  <a:srgbClr val="06287E"/>
+                </a:solidFill>
+                <a:latin typeface="Courier"/>
+              </a:rPr>
+              <a:t>sqrt</a:t>
+            </a:r>
+            <a:r>
+              <a:rPr>
+                <a:latin typeface="Courier"/>
+              </a:rPr>
+              <a:t>(n</a:t>
+            </a:r>
+            <a:r>
+              <a:rPr>
+                <a:solidFill>
+                  <a:srgbClr val="4070A0"/>
+                </a:solidFill>
+                <a:latin typeface="Courier"/>
+              </a:rPr>
+              <a:t>/</a:t>
+            </a:r>
+            <a:r>
+              <a:rPr>
+                <a:solidFill>
+                  <a:srgbClr val="40A070"/>
+                </a:solidFill>
+                <a:latin typeface="Courier"/>
+              </a:rPr>
+              <a:t>2</a:t>
+            </a:r>
+            <a:r>
+              <a:rPr>
+                <a:latin typeface="Courier"/>
+              </a:rPr>
+              <a:t>)</a:t>
+            </a:r>
+            <a:r>
+              <a:rPr>
+                <a:solidFill>
+                  <a:srgbClr val="4070A0"/>
+                </a:solidFill>
+                <a:latin typeface="Courier"/>
+              </a:rPr>
+              <a:t>*</a:t>
+            </a:r>
+            <a:r>
+              <a:rPr>
+                <a:latin typeface="Courier"/>
+              </a:rPr>
+              <a:t>ES)</a:t>
+            </a:r>
+          </a:p>
+          <a:p>
+            <a:pPr lvl="0" indent="0">
+              <a:buNone/>
+            </a:pPr>
+            <a:r>
+              <a:rPr>
+                <a:latin typeface="Courier"/>
+              </a:rPr>
+              <a:t>## [1] 0.8059741</a:t>
+            </a:r>
+          </a:p>
+        </p:txBody>
+      </p:sp>
+    </p:spTree>
+  </p:cSld>
+</p:sld>
+</file>
+
+<file path=ppt/slides/slide18.xml><?xml version="1.0" encoding="utf-8"?>
+<p:sld xmlns:a="http://schemas.openxmlformats.org/drawingml/2006/main" xmlns:r="http://schemas.openxmlformats.org/officeDocument/2006/relationships" xmlns:p="http://schemas.openxmlformats.org/presentationml/2006/main">
+  <p:cSld>
+    <p:spTree>
+      <p:nvGrpSpPr>
+        <p:cNvPr id="1" name=""/>
+        <p:cNvGrpSpPr/>
+        <p:nvPr/>
+      </p:nvGrpSpPr>
+      <p:grpSpPr>
+        <a:xfrm>
+          <a:off x="0" y="0"/>
+          <a:ext cx="0" cy="0"/>
+          <a:chOff x="0" y="0"/>
+          <a:chExt cx="0" cy="0"/>
+        </a:xfrm>
+      </p:grpSpPr>
+      <p:sp>
+        <p:nvSpPr>
+          <p:cNvPr id="2" name="Title 1"/>
+          <p:cNvSpPr>
+            <a:spLocks noGrp="1"/>
+          </p:cNvSpPr>
+          <p:nvPr>
+            <p:ph type="title"/>
+          </p:nvPr>
+        </p:nvSpPr>
+        <p:spPr/>
+        <p:txBody>
+          <a:bodyPr/>
+          <a:lstStyle/>
+          <a:p>
+            <a:pPr lvl="0" indent="0" marL="0">
+              <a:buNone/>
+            </a:pPr>
+            <a:r>
+              <a:rPr/>
+              <a:t>Using power.t.test (1/2)</a:t>
+            </a:r>
+          </a:p>
+        </p:txBody>
+      </p:sp>
+      <p:sp>
+        <p:nvSpPr>
+          <p:cNvPr id="3" name="Content Placeholder 2"/>
+          <p:cNvSpPr>
+            <a:spLocks noGrp="1"/>
+          </p:cNvSpPr>
+          <p:nvPr>
+            <p:ph idx="1"/>
+          </p:nvPr>
+        </p:nvSpPr>
+        <p:spPr/>
+        <p:txBody>
+          <a:bodyPr/>
+          <a:lstStyle/>
+          <a:p>
+            <a:pPr lvl="0" indent="0">
+              <a:buNone/>
+            </a:pPr>
+            <a:r>
+              <a:rPr>
+                <a:latin typeface="Courier"/>
+              </a:rPr>
+              <a:t>estimated_power </a:t>
+            </a:r>
+            <a:r>
+              <a:rPr>
+                <a:solidFill>
+                  <a:srgbClr val="007020"/>
+                </a:solidFill>
+                <a:latin typeface="Courier"/>
+              </a:rPr>
+              <a:t>&lt;-</a:t>
+            </a:r>
+            <a:r>
+              <a:rPr>
+                <a:latin typeface="Courier"/>
+              </a:rPr>
+              <a:t> </a:t>
+            </a:r>
+            <a:br/>
+            <a:r>
+              <a:rPr>
+                <a:latin typeface="Courier"/>
+              </a:rPr>
+              <a:t>  </a:t>
+            </a:r>
+            <a:r>
+              <a:rPr>
+                <a:solidFill>
+                  <a:srgbClr val="06287E"/>
+                </a:solidFill>
+                <a:latin typeface="Courier"/>
+              </a:rPr>
+              <a:t>power.t.test</a:t>
+            </a:r>
+            <a:r>
+              <a:rPr>
+                <a:latin typeface="Courier"/>
+              </a:rPr>
+              <a:t>(</a:t>
+            </a:r>
+            <a:br/>
+            <a:r>
+              <a:rPr>
+                <a:latin typeface="Courier"/>
+              </a:rPr>
+              <a:t>    </a:t>
+            </a:r>
+            <a:r>
+              <a:rPr>
+                <a:solidFill>
+                  <a:srgbClr val="7D9029"/>
+                </a:solidFill>
+                <a:latin typeface="Courier"/>
+              </a:rPr>
+              <a:t>n=</a:t>
+            </a:r>
+            <a:r>
+              <a:rPr>
+                <a:solidFill>
+                  <a:srgbClr val="40A070"/>
+                </a:solidFill>
+                <a:latin typeface="Courier"/>
+              </a:rPr>
+              <a:t>64</a:t>
+            </a:r>
+            <a:r>
+              <a:rPr>
+                <a:latin typeface="Courier"/>
+              </a:rPr>
+              <a:t>, </a:t>
+            </a:r>
+            <a:br/>
+            <a:r>
+              <a:rPr>
+                <a:latin typeface="Courier"/>
+              </a:rPr>
+              <a:t>    </a:t>
+            </a:r>
+            <a:r>
+              <a:rPr>
+                <a:solidFill>
+                  <a:srgbClr val="7D9029"/>
+                </a:solidFill>
+                <a:latin typeface="Courier"/>
+              </a:rPr>
+              <a:t>delta=</a:t>
+            </a:r>
+            <a:r>
+              <a:rPr>
+                <a:solidFill>
+                  <a:srgbClr val="40A070"/>
+                </a:solidFill>
+                <a:latin typeface="Courier"/>
+              </a:rPr>
+              <a:t>0.5</a:t>
+            </a:r>
+            <a:r>
+              <a:rPr>
+                <a:latin typeface="Courier"/>
+              </a:rPr>
+              <a:t>, </a:t>
+            </a:r>
+            <a:br/>
+            <a:r>
+              <a:rPr>
+                <a:latin typeface="Courier"/>
+              </a:rPr>
+              <a:t>    </a:t>
+            </a:r>
+            <a:r>
+              <a:rPr>
+                <a:solidFill>
+                  <a:srgbClr val="7D9029"/>
+                </a:solidFill>
+                <a:latin typeface="Courier"/>
+              </a:rPr>
+              <a:t>sd=</a:t>
+            </a:r>
+            <a:r>
+              <a:rPr>
+                <a:solidFill>
+                  <a:srgbClr val="40A070"/>
+                </a:solidFill>
+                <a:latin typeface="Courier"/>
+              </a:rPr>
+              <a:t>1</a:t>
+            </a:r>
+            <a:r>
+              <a:rPr>
+                <a:latin typeface="Courier"/>
+              </a:rPr>
+              <a:t>, </a:t>
+            </a:r>
+            <a:br/>
+            <a:r>
+              <a:rPr>
+                <a:latin typeface="Courier"/>
+              </a:rPr>
+              <a:t>    </a:t>
+            </a:r>
+            <a:r>
+              <a:rPr>
+                <a:solidFill>
+                  <a:srgbClr val="7D9029"/>
+                </a:solidFill>
+                <a:latin typeface="Courier"/>
+              </a:rPr>
+              <a:t>sig.level=</a:t>
+            </a:r>
+            <a:r>
+              <a:rPr>
+                <a:solidFill>
+                  <a:srgbClr val="40A070"/>
+                </a:solidFill>
+                <a:latin typeface="Courier"/>
+              </a:rPr>
+              <a:t>0.025</a:t>
+            </a:r>
+            <a:r>
+              <a:rPr>
+                <a:latin typeface="Courier"/>
+              </a:rPr>
+              <a:t>, </a:t>
+            </a:r>
+            <a:br/>
+            <a:r>
+              <a:rPr>
+                <a:latin typeface="Courier"/>
+              </a:rPr>
+              <a:t>    </a:t>
+            </a:r>
+            <a:r>
+              <a:rPr>
+                <a:solidFill>
+                  <a:srgbClr val="7D9029"/>
+                </a:solidFill>
+                <a:latin typeface="Courier"/>
+              </a:rPr>
+              <a:t>power=</a:t>
+            </a:r>
+            <a:r>
+              <a:rPr>
+                <a:solidFill>
+                  <a:srgbClr val="880000"/>
+                </a:solidFill>
+                <a:latin typeface="Courier"/>
+              </a:rPr>
+              <a:t>NULL</a:t>
+            </a:r>
+            <a:r>
+              <a:rPr>
+                <a:latin typeface="Courier"/>
+              </a:rPr>
+              <a:t>,</a:t>
+            </a:r>
+            <a:br/>
+            <a:r>
+              <a:rPr>
+                <a:latin typeface="Courier"/>
+              </a:rPr>
+              <a:t>    </a:t>
+            </a:r>
+            <a:r>
+              <a:rPr>
+                <a:solidFill>
+                  <a:srgbClr val="7D9029"/>
+                </a:solidFill>
+                <a:latin typeface="Courier"/>
+              </a:rPr>
+              <a:t>type=</a:t>
+            </a:r>
+            <a:r>
+              <a:rPr>
+                <a:solidFill>
+                  <a:srgbClr val="4070A0"/>
+                </a:solidFill>
+                <a:latin typeface="Courier"/>
+              </a:rPr>
+              <a:t>"two.sample"</a:t>
+            </a:r>
+            <a:r>
+              <a:rPr>
+                <a:latin typeface="Courier"/>
+              </a:rPr>
+              <a:t>,</a:t>
+            </a:r>
+            <a:br/>
+            <a:r>
+              <a:rPr>
+                <a:latin typeface="Courier"/>
+              </a:rPr>
+              <a:t>    </a:t>
+            </a:r>
+            <a:r>
+              <a:rPr>
+                <a:solidFill>
+                  <a:srgbClr val="7D9029"/>
+                </a:solidFill>
+                <a:latin typeface="Courier"/>
+              </a:rPr>
+              <a:t>alternative=</a:t>
+            </a:r>
+            <a:r>
+              <a:rPr>
+                <a:solidFill>
+                  <a:srgbClr val="4070A0"/>
+                </a:solidFill>
+                <a:latin typeface="Courier"/>
+              </a:rPr>
+              <a:t>"one.sided"</a:t>
+            </a:r>
+            <a:r>
+              <a:rPr>
+                <a:latin typeface="Courier"/>
+              </a:rPr>
+              <a:t>)</a:t>
+            </a:r>
+          </a:p>
+        </p:txBody>
+      </p:sp>
+    </p:spTree>
+  </p:cSld>
+</p:sld>
+</file>
+
+<file path=ppt/slides/slide19.xml><?xml version="1.0" encoding="utf-8"?>
+<p:sld xmlns:a="http://schemas.openxmlformats.org/drawingml/2006/main" xmlns:r="http://schemas.openxmlformats.org/officeDocument/2006/relationships" xmlns:p="http://schemas.openxmlformats.org/presentationml/2006/main">
+  <p:cSld>
+    <p:spTree>
+      <p:nvGrpSpPr>
+        <p:cNvPr id="1" name=""/>
+        <p:cNvGrpSpPr/>
+        <p:nvPr/>
+      </p:nvGrpSpPr>
+      <p:grpSpPr>
+        <a:xfrm>
+          <a:off x="0" y="0"/>
+          <a:ext cx="0" cy="0"/>
+          <a:chOff x="0" y="0"/>
+          <a:chExt cx="0" cy="0"/>
+        </a:xfrm>
+      </p:grpSpPr>
+      <p:sp>
+        <p:nvSpPr>
+          <p:cNvPr id="2" name="Title 1"/>
+          <p:cNvSpPr>
+            <a:spLocks noGrp="1"/>
+          </p:cNvSpPr>
+          <p:nvPr>
+            <p:ph type="title"/>
+          </p:nvPr>
+        </p:nvSpPr>
+        <p:spPr/>
+        <p:txBody>
+          <a:bodyPr/>
+          <a:lstStyle/>
+          <a:p>
+            <a:pPr lvl="0" indent="0" marL="0">
+              <a:buNone/>
+            </a:pPr>
+            <a:r>
+              <a:rPr/>
+              <a:t>Using power.t.test (2/2)</a:t>
+            </a:r>
+          </a:p>
+        </p:txBody>
+      </p:sp>
+      <p:sp>
+        <p:nvSpPr>
+          <p:cNvPr id="3" name="Content Placeholder 2"/>
+          <p:cNvSpPr>
+            <a:spLocks noGrp="1"/>
+          </p:cNvSpPr>
+          <p:nvPr>
+            <p:ph idx="1"/>
+          </p:nvPr>
+        </p:nvSpPr>
+        <p:spPr/>
+        <p:txBody>
+          <a:bodyPr/>
+          <a:lstStyle/>
+          <a:p>
+            <a:pPr lvl="0" indent="0">
+              <a:buNone/>
+            </a:pPr>
+            <a:r>
+              <a:rPr>
+                <a:solidFill>
+                  <a:srgbClr val="06287E"/>
+                </a:solidFill>
+                <a:latin typeface="Courier"/>
+              </a:rPr>
+              <a:t>names</a:t>
+            </a:r>
+            <a:r>
+              <a:rPr>
+                <a:latin typeface="Courier"/>
+              </a:rPr>
+              <a:t>(estimated_power)</a:t>
+            </a:r>
+          </a:p>
+          <a:p>
+            <a:pPr lvl="0" indent="0">
+              <a:buNone/>
+            </a:pPr>
+            <a:r>
+              <a:rPr>
+                <a:latin typeface="Courier"/>
+              </a:rPr>
+              <a:t>## [1] "n"           "delta"       "sd"          "sig.level"   "power"      
+## [6] "alternative" "note"        "method"</a:t>
+            </a:r>
+          </a:p>
+          <a:p>
+            <a:pPr lvl="0" indent="0">
+              <a:buNone/>
+            </a:pPr>
+            <a:r>
+              <a:rPr>
+                <a:latin typeface="Courier"/>
+              </a:rPr>
+              <a:t>estimated_power</a:t>
+            </a:r>
+            <a:r>
+              <a:rPr>
+                <a:solidFill>
+                  <a:srgbClr val="4070A0"/>
+                </a:solidFill>
+                <a:latin typeface="Courier"/>
+              </a:rPr>
+              <a:t>$</a:t>
+            </a:r>
+            <a:r>
+              <a:rPr>
+                <a:latin typeface="Courier"/>
+              </a:rPr>
+              <a:t>power</a:t>
+            </a:r>
+          </a:p>
+          <a:p>
+            <a:pPr lvl="0" indent="0">
+              <a:buNone/>
+            </a:pPr>
+            <a:r>
+              <a:rPr>
+                <a:latin typeface="Courier"/>
+              </a:rPr>
+              <a:t>## [1] 0.8014586</a:t>
+            </a:r>
+          </a:p>
+          <a:p>
+            <a:pPr lvl="0" indent="0">
+              <a:buNone/>
+            </a:pPr>
+            <a:r>
+              <a:rPr>
+                <a:latin typeface="Courier"/>
+              </a:rPr>
+              <a:t>estimated_power</a:t>
+            </a:r>
+            <a:r>
+              <a:rPr>
+                <a:solidFill>
+                  <a:srgbClr val="4070A0"/>
+                </a:solidFill>
+                <a:latin typeface="Courier"/>
+              </a:rPr>
+              <a:t>$</a:t>
+            </a:r>
+            <a:r>
+              <a:rPr>
+                <a:latin typeface="Courier"/>
+              </a:rPr>
+              <a:t>note</a:t>
+            </a:r>
+          </a:p>
+          <a:p>
+            <a:pPr lvl="0" indent="0">
+              <a:buNone/>
+            </a:pPr>
+            <a:r>
+              <a:rPr>
+                <a:latin typeface="Courier"/>
+              </a:rPr>
+              <a:t>## [1] "n is number in *each* group"</a:t>
+            </a:r>
+          </a:p>
+        </p:txBody>
+      </p:sp>
+    </p:spTree>
+  </p:cSld>
+</p:sld>
+</file>
+
 <file path=ppt/slides/slide2.xml><?xml version="1.0" encoding="utf-8"?>
 <p:sld xmlns:a="http://schemas.openxmlformats.org/drawingml/2006/main" xmlns:r="http://schemas.openxmlformats.org/officeDocument/2006/relationships" xmlns:p="http://schemas.openxmlformats.org/presentationml/2006/main">
   <p:cSld>
@@ -4120,6 +6792,293 @@
             <a:r>
               <a:rPr/>
               <a:t>Figure 1. Light bulb joke</a:t>
+            </a:r>
+          </a:p>
+        </p:txBody>
+      </p:sp>
+    </p:spTree>
+  </p:cSld>
+</p:sld>
+</file>
+
+<file path=ppt/slides/slide20.xml><?xml version="1.0" encoding="utf-8"?>
+<p:sld xmlns:a="http://schemas.openxmlformats.org/drawingml/2006/main" xmlns:r="http://schemas.openxmlformats.org/officeDocument/2006/relationships" xmlns:p="http://schemas.openxmlformats.org/presentationml/2006/main">
+  <p:cSld>
+    <p:spTree>
+      <p:nvGrpSpPr>
+        <p:cNvPr id="1" name=""/>
+        <p:cNvGrpSpPr/>
+        <p:nvPr/>
+      </p:nvGrpSpPr>
+      <p:grpSpPr>
+        <a:xfrm>
+          <a:off x="0" y="0"/>
+          <a:ext cx="0" cy="0"/>
+          <a:chOff x="0" y="0"/>
+          <a:chExt cx="0" cy="0"/>
+        </a:xfrm>
+      </p:grpSpPr>
+      <p:sp>
+        <p:nvSpPr>
+          <p:cNvPr id="2" name="Title 1"/>
+          <p:cNvSpPr>
+            <a:spLocks noGrp="1"/>
+          </p:cNvSpPr>
+          <p:nvPr>
+            <p:ph type="title"/>
+          </p:nvPr>
+        </p:nvSpPr>
+        <p:spPr/>
+        <p:txBody>
+          <a:bodyPr/>
+          <a:lstStyle/>
+          <a:p>
+            <a:pPr lvl="0" indent="0" marL="0">
+              <a:buNone/>
+            </a:pPr>
+            <a:r>
+              <a:rPr/>
+              <a:t>Other libraries</a:t>
+            </a:r>
+          </a:p>
+        </p:txBody>
+      </p:sp>
+      <p:sp>
+        <p:nvSpPr>
+          <p:cNvPr id="3" name="Content Placeholder 2"/>
+          <p:cNvSpPr>
+            <a:spLocks noGrp="1"/>
+          </p:cNvSpPr>
+          <p:nvPr>
+            <p:ph idx="1"/>
+          </p:nvPr>
+        </p:nvSpPr>
+        <p:spPr/>
+        <p:txBody>
+          <a:bodyPr/>
+          <a:lstStyle/>
+          <a:p>
+            <a:pPr lvl="0"/>
+            <a:r>
+              <a:rPr/>
+              <a:t>Hmisc</a:t>
+            </a:r>
+          </a:p>
+          <a:p>
+            <a:pPr lvl="0"/>
+            <a:r>
+              <a:rPr/>
+              <a:t>pwr</a:t>
+            </a:r>
+          </a:p>
+          <a:p>
+            <a:pPr lvl="0"/>
+            <a:r>
+              <a:rPr/>
+              <a:t>pwr2</a:t>
+            </a:r>
+          </a:p>
+          <a:p>
+            <a:pPr lvl="0"/>
+            <a:r>
+              <a:rPr/>
+              <a:t>samplesize</a:t>
+            </a:r>
+          </a:p>
+          <a:p>
+            <a:pPr lvl="0"/>
+            <a:r>
+              <a:rPr/>
+              <a:t>Many others</a:t>
+            </a:r>
+          </a:p>
+        </p:txBody>
+      </p:sp>
+    </p:spTree>
+  </p:cSld>
+</p:sld>
+</file>
+
+<file path=ppt/slides/slide21.xml><?xml version="1.0" encoding="utf-8"?>
+<p:sld xmlns:a="http://schemas.openxmlformats.org/drawingml/2006/main" xmlns:r="http://schemas.openxmlformats.org/officeDocument/2006/relationships" xmlns:p="http://schemas.openxmlformats.org/presentationml/2006/main">
+  <p:cSld>
+    <p:spTree>
+      <p:nvGrpSpPr>
+        <p:cNvPr id="1" name=""/>
+        <p:cNvGrpSpPr/>
+        <p:nvPr/>
+      </p:nvGrpSpPr>
+      <p:grpSpPr>
+        <a:xfrm>
+          <a:off x="0" y="0"/>
+          <a:ext cx="0" cy="0"/>
+          <a:chOff x="0" y="0"/>
+          <a:chExt cx="0" cy="0"/>
+        </a:xfrm>
+      </p:grpSpPr>
+      <p:sp>
+        <p:nvSpPr>
+          <p:cNvPr id="2" name="Title 1"/>
+          <p:cNvSpPr>
+            <a:spLocks noGrp="1"/>
+          </p:cNvSpPr>
+          <p:nvPr>
+            <p:ph type="title"/>
+          </p:nvPr>
+        </p:nvSpPr>
+        <p:spPr/>
+        <p:txBody>
+          <a:bodyPr/>
+          <a:lstStyle/>
+          <a:p>
+            <a:pPr lvl="0" indent="0" marL="0">
+              <a:buNone/>
+            </a:pPr>
+            <a:r>
+              <a:rPr/>
+              <a:t>Simulation</a:t>
+            </a:r>
+          </a:p>
+        </p:txBody>
+      </p:sp>
+      <p:sp>
+        <p:nvSpPr>
+          <p:cNvPr id="3" name="Content Placeholder 2"/>
+          <p:cNvSpPr>
+            <a:spLocks noGrp="1"/>
+          </p:cNvSpPr>
+          <p:nvPr>
+            <p:ph idx="1"/>
+          </p:nvPr>
+        </p:nvSpPr>
+        <p:spPr/>
+        <p:txBody>
+          <a:bodyPr/>
+          <a:lstStyle/>
+          <a:p>
+            <a:pPr lvl="0"/>
+            <a:r>
+              <a:rPr/>
+              <a:t>From scratch</a:t>
+            </a:r>
+          </a:p>
+          <a:p>
+            <a:pPr lvl="0"/>
+            <a:r>
+              <a:rPr/>
+              <a:t>simglm library</a:t>
+            </a:r>
+          </a:p>
+          <a:p>
+            <a:pPr lvl="0"/>
+            <a:r>
+              <a:rPr/>
+              <a:t>Bayesian simulation using MCMC??</a:t>
+            </a:r>
+          </a:p>
+        </p:txBody>
+      </p:sp>
+    </p:spTree>
+  </p:cSld>
+</p:sld>
+</file>
+
+<file path=ppt/slides/slide22.xml><?xml version="1.0" encoding="utf-8"?>
+<p:sld xmlns:a="http://schemas.openxmlformats.org/drawingml/2006/main" xmlns:r="http://schemas.openxmlformats.org/officeDocument/2006/relationships" xmlns:p="http://schemas.openxmlformats.org/presentationml/2006/main">
+  <p:cSld>
+    <p:spTree>
+      <p:nvGrpSpPr>
+        <p:cNvPr id="1" name=""/>
+        <p:cNvGrpSpPr/>
+        <p:nvPr/>
+      </p:nvGrpSpPr>
+      <p:grpSpPr>
+        <a:xfrm>
+          <a:off x="0" y="0"/>
+          <a:ext cx="0" cy="0"/>
+          <a:chOff x="0" y="0"/>
+          <a:chExt cx="0" cy="0"/>
+        </a:xfrm>
+      </p:grpSpPr>
+      <p:sp>
+        <p:nvSpPr>
+          <p:cNvPr id="2" name="Title 1"/>
+          <p:cNvSpPr>
+            <a:spLocks noGrp="1"/>
+          </p:cNvSpPr>
+          <p:nvPr>
+            <p:ph type="title"/>
+          </p:nvPr>
+        </p:nvSpPr>
+        <p:spPr/>
+        <p:txBody>
+          <a:bodyPr/>
+          <a:lstStyle/>
+          <a:p>
+            <a:pPr lvl="0" indent="0" marL="0">
+              <a:buNone/>
+            </a:pPr>
+            <a:r>
+              <a:rPr/>
+              <a:t>What if you have no hypothesis?</a:t>
+            </a:r>
+          </a:p>
+        </p:txBody>
+      </p:sp>
+      <p:sp>
+        <p:nvSpPr>
+          <p:cNvPr id="3" name="Content Placeholder 2"/>
+          <p:cNvSpPr>
+            <a:spLocks noGrp="1"/>
+          </p:cNvSpPr>
+          <p:nvPr>
+            <p:ph idx="1"/>
+          </p:nvPr>
+        </p:nvSpPr>
+        <p:spPr/>
+        <p:txBody>
+          <a:bodyPr/>
+          <a:lstStyle/>
+          <a:p>
+            <a:pPr lvl="0"/>
+            <a:r>
+              <a:rPr/>
+              <a:t>Descriptive study</a:t>
+            </a:r>
+          </a:p>
+          <a:p>
+            <a:pPr lvl="1"/>
+            <a:r>
+              <a:rPr/>
+              <a:t>Use CI width to estimate sample size</a:t>
+            </a:r>
+          </a:p>
+          <a:p>
+            <a:pPr lvl="0"/>
+            <a:r>
+              <a:rPr/>
+              <a:t>Focus groups</a:t>
+            </a:r>
+          </a:p>
+          <a:p>
+            <a:pPr lvl="1"/>
+            <a:r>
+              <a:rPr/>
+              <a:t>Saturation</a:t>
+            </a:r>
+          </a:p>
+          <a:p>
+            <a:pPr lvl="0"/>
+            <a:r>
+              <a:rPr/>
+              <a:t>Other qualitative studies</a:t>
+            </a:r>
+          </a:p>
+          <a:p>
+            <a:pPr lvl="1"/>
+            <a:r>
+              <a:rPr/>
+              <a:t>Use qualitative criteria</a:t>
             </a:r>
           </a:p>
         </p:txBody>
@@ -4339,6 +7298,9 @@
                         <m:r>
                           <m:t>t</m:t>
                         </m:r>
+                        <m:r>
+                          <m:t> </m:t>
+                        </m:r>
                         <m:sSub>
                           <m:e>
                             <m:r>
@@ -4417,7 +7379,7 @@
             </a:pPr>
             <a:r>
               <a:rPr/>
-              <a:t>Why are power and sample size calculations important?</a:t>
+              <a:t>Three things that you need</a:t>
             </a:r>
           </a:p>
         </p:txBody>
@@ -4440,49 +7402,21 @@
             <a:pPr lvl="0"/>
             <a:r>
               <a:rPr/>
-              <a:t>Fictional research report</a:t>
-            </a:r>
-          </a:p>
-          <a:p>
-            <a:pPr lvl="1"/>
+              <a:t>Research hypothesis</a:t>
+            </a:r>
+          </a:p>
+          <a:p>
+            <a:pPr lvl="0"/>
             <a:r>
               <a:rPr/>
-              <a:t>This is a new and innovative surgical approach and we are 95% confident that the cure rate is somewhere between 3% and 98%.</a:t>
+              <a:t>Standard deviation of your outcome measure</a:t>
             </a:r>
           </a:p>
           <a:p>
             <a:pPr lvl="0"/>
             <a:r>
               <a:rPr/>
-              <a:t>Thornley and Adams review</a:t>
-            </a:r>
-          </a:p>
-          <a:p>
-            <a:pPr lvl="1"/>
-            <a:r>
-              <a:rPr/>
-              <a:t>2,000 studies</a:t>
-            </a:r>
-          </a:p>
-          <a:p>
-            <a:pPr lvl="1"/>
-            <a:r>
-              <a:rPr/>
-              <a:t>Target sample size=300</a:t>
-            </a:r>
-          </a:p>
-          <a:p>
-            <a:pPr lvl="1"/>
-            <a:r>
-              <a:rPr/>
-              <a:t>Average sample size=65</a:t>
-            </a:r>
-          </a:p>
-          <a:p>
-            <a:pPr lvl="1"/>
-            <a:r>
-              <a:rPr/>
-              <a:t>Only 3% met the target sample size</a:t>
+              <a:t>Minimum clinically important difference</a:t>
             </a:r>
           </a:p>
         </p:txBody>
@@ -4493,6 +7427,118 @@
 </file>
 
 <file path=ppt/slides/slide5.xml><?xml version="1.0" encoding="utf-8"?>
+<p:sld xmlns:a="http://schemas.openxmlformats.org/drawingml/2006/main" xmlns:r="http://schemas.openxmlformats.org/officeDocument/2006/relationships" xmlns:p="http://schemas.openxmlformats.org/presentationml/2006/main">
+  <p:cSld>
+    <p:spTree>
+      <p:nvGrpSpPr>
+        <p:cNvPr id="1" name=""/>
+        <p:cNvGrpSpPr/>
+        <p:nvPr/>
+      </p:nvGrpSpPr>
+      <p:grpSpPr>
+        <a:xfrm>
+          <a:off x="0" y="0"/>
+          <a:ext cx="0" cy="0"/>
+          <a:chOff x="0" y="0"/>
+          <a:chExt cx="0" cy="0"/>
+        </a:xfrm>
+      </p:grpSpPr>
+      <p:sp>
+        <p:nvSpPr>
+          <p:cNvPr id="2" name="Title 1"/>
+          <p:cNvSpPr>
+            <a:spLocks noGrp="1"/>
+          </p:cNvSpPr>
+          <p:nvPr>
+            <p:ph type="title"/>
+          </p:nvPr>
+        </p:nvSpPr>
+        <p:spPr/>
+        <p:txBody>
+          <a:bodyPr/>
+          <a:lstStyle/>
+          <a:p>
+            <a:pPr lvl="0" indent="0" marL="0">
+              <a:buNone/>
+            </a:pPr>
+            <a:r>
+              <a:rPr/>
+              <a:t>Why are power and sample size calculations important?</a:t>
+            </a:r>
+          </a:p>
+        </p:txBody>
+      </p:sp>
+      <p:sp>
+        <p:nvSpPr>
+          <p:cNvPr id="3" name="Content Placeholder 2"/>
+          <p:cNvSpPr>
+            <a:spLocks noGrp="1"/>
+          </p:cNvSpPr>
+          <p:nvPr>
+            <p:ph idx="1"/>
+          </p:nvPr>
+        </p:nvSpPr>
+        <p:spPr/>
+        <p:txBody>
+          <a:bodyPr/>
+          <a:lstStyle/>
+          <a:p>
+            <a:pPr lvl="0"/>
+            <a:r>
+              <a:rPr/>
+              <a:t>Fictional research report</a:t>
+            </a:r>
+          </a:p>
+          <a:p>
+            <a:pPr lvl="1"/>
+            <a:r>
+              <a:rPr/>
+              <a:t>This is a new and innovative surgical approach and we are 95% confident that the cure rate is somewhere between 3% and 98%.</a:t>
+            </a:r>
+          </a:p>
+          <a:p>
+            <a:pPr lvl="0"/>
+            <a:r>
+              <a:rPr/>
+              <a:t>Thornley and Adams review</a:t>
+            </a:r>
+          </a:p>
+          <a:p>
+            <a:pPr lvl="1"/>
+            <a:r>
+              <a:rPr/>
+              <a:t>2,000 studies</a:t>
+            </a:r>
+          </a:p>
+          <a:p>
+            <a:pPr lvl="1"/>
+            <a:r>
+              <a:rPr/>
+              <a:t>Target sample size=300</a:t>
+            </a:r>
+          </a:p>
+          <a:p>
+            <a:pPr lvl="1"/>
+            <a:r>
+              <a:rPr/>
+              <a:t>Average sample size=65</a:t>
+            </a:r>
+          </a:p>
+          <a:p>
+            <a:pPr lvl="1"/>
+            <a:r>
+              <a:rPr/>
+              <a:t>Only 3% met the target sample size</a:t>
+            </a:r>
+          </a:p>
+        </p:txBody>
+      </p:sp>
+    </p:spTree>
+  </p:cSld>
+</p:sld>
+</file>
+
+<file path=ppt/slides/slide6.xml><?xml version="1.0" encoding="utf-8"?>
 <p:sld xmlns:a="http://schemas.openxmlformats.org/drawingml/2006/main" xmlns:r="http://schemas.openxmlformats.org/officeDocument/2006/relationships" xmlns:p="http://schemas.openxmlformats.org/presentationml/2006/main">
   <p:cSld>
     <p:spTree>
@@ -4599,7 +7645,7 @@
 </p:sld>
 </file>
 
-<file path=ppt/slides/slide6.xml><?xml version="1.0" encoding="utf-8"?>
+<file path=ppt/slides/slide7.xml><?xml version="1.0" encoding="utf-8"?>
 <p:sld xmlns:a="http://schemas.openxmlformats.org/drawingml/2006/main" xmlns:r="http://schemas.openxmlformats.org/officeDocument/2006/relationships" xmlns:p="http://schemas.openxmlformats.org/presentationml/2006/main">
   <p:cSld>
     <p:spTree>
@@ -4706,7 +7752,7 @@
 </p:sld>
 </file>
 
-<file path=ppt/slides/slide7.xml><?xml version="1.0" encoding="utf-8"?>
+<file path=ppt/slides/slide8.xml><?xml version="1.0" encoding="utf-8"?>
 <p:sld xmlns:a="http://schemas.openxmlformats.org/drawingml/2006/main" xmlns:r="http://schemas.openxmlformats.org/officeDocument/2006/relationships" xmlns:p="http://schemas.openxmlformats.org/presentationml/2006/main">
   <p:cSld>
     <p:spTree>
@@ -4813,76 +7859,6 @@
 </p:sld>
 </file>
 
-<file path=ppt/slides/slide8.xml><?xml version="1.0" encoding="utf-8"?>
-<p:sld xmlns:a="http://schemas.openxmlformats.org/drawingml/2006/main" xmlns:r="http://schemas.openxmlformats.org/officeDocument/2006/relationships" xmlns:p="http://schemas.openxmlformats.org/presentationml/2006/main">
-  <p:cSld>
-    <p:spTree>
-      <p:nvGrpSpPr>
-        <p:cNvPr id="1" name=""/>
-        <p:cNvGrpSpPr/>
-        <p:nvPr/>
-      </p:nvGrpSpPr>
-      <p:grpSpPr>
-        <a:xfrm>
-          <a:off x="0" y="0"/>
-          <a:ext cx="0" cy="0"/>
-          <a:chOff x="0" y="0"/>
-          <a:chExt cx="0" cy="0"/>
-        </a:xfrm>
-      </p:grpSpPr>
-      <p:sp>
-        <p:nvSpPr>
-          <p:cNvPr id="2" name="Title 1"/>
-          <p:cNvSpPr>
-            <a:spLocks noGrp="1"/>
-          </p:cNvSpPr>
-          <p:nvPr>
-            <p:ph type="title"/>
-          </p:nvPr>
-        </p:nvSpPr>
-        <p:spPr/>
-        <p:txBody>
-          <a:bodyPr/>
-          <a:lstStyle/>
-          <a:p>
-            <a:pPr lvl="0" indent="0" marL="0">
-              <a:buNone/>
-            </a:pPr>
-            <a:r>
-              <a:rPr/>
-              <a:t>Other software</a:t>
-            </a:r>
-          </a:p>
-        </p:txBody>
-      </p:sp>
-      <p:sp>
-        <p:nvSpPr>
-          <p:cNvPr id="3" name="Content Placeholder 2"/>
-          <p:cNvSpPr>
-            <a:spLocks noGrp="1"/>
-          </p:cNvSpPr>
-          <p:nvPr>
-            <p:ph idx="1"/>
-          </p:nvPr>
-        </p:nvSpPr>
-        <p:spPr/>
-        <p:txBody>
-          <a:bodyPr/>
-          <a:lstStyle/>
-          <a:p>
-            <a:pPr lvl="0"/>
-            <a:r>
-              <a:rPr/>
-              <a:t>nQuery advisor</a:t>
-            </a:r>
-          </a:p>
-        </p:txBody>
-      </p:sp>
-    </p:spTree>
-  </p:cSld>
-</p:sld>
-</file>
-
 <file path=ppt/slides/slide9.xml><?xml version="1.0" encoding="utf-8"?>
 <p:sld xmlns:a="http://schemas.openxmlformats.org/drawingml/2006/main" xmlns:r="http://schemas.openxmlformats.org/officeDocument/2006/relationships" xmlns:p="http://schemas.openxmlformats.org/presentationml/2006/main">
   <p:cSld>
@@ -4920,7 +7896,44 @@
             </a:pPr>
             <a:r>
               <a:rPr/>
-              <a:t>Software to calculate power and sample size: R</a:t>
+              <a:t>Other software</a:t>
+            </a:r>
+          </a:p>
+        </p:txBody>
+      </p:sp>
+      <p:sp>
+        <p:nvSpPr>
+          <p:cNvPr id="3" name="Content Placeholder 2"/>
+          <p:cNvSpPr>
+            <a:spLocks noGrp="1"/>
+          </p:cNvSpPr>
+          <p:nvPr>
+            <p:ph idx="1"/>
+          </p:nvPr>
+        </p:nvSpPr>
+        <p:spPr/>
+        <p:txBody>
+          <a:bodyPr/>
+          <a:lstStyle/>
+          <a:p>
+            <a:pPr lvl="0"/>
+            <a:r>
+              <a:rPr/>
+              <a:t>nQuery advisor</a:t>
+            </a:r>
+          </a:p>
+          <a:p>
+            <a:pPr lvl="0"/>
+            <a:r>
+              <a:rPr/>
+              <a:t>G*Power</a:t>
+            </a:r>
+          </a:p>
+          <a:p>
+            <a:pPr lvl="0"/>
+            <a:r>
+              <a:rPr/>
+              <a:t>Power and Precision</a:t>
             </a:r>
           </a:p>
         </p:txBody>

</xml_diff>

<commit_message>
Added power-and-sample-size speaker notes
</commit_message>
<xml_diff>
--- a/power/power-and-sample-size-slides.pptx
+++ b/power/power-and-sample-size-slides.pptx
@@ -669,7 +669,35 @@
             </a:pPr>
             <a:r>
               <a:rPr/>
-              <a:t>Here’s the actual sample size calculation using the qnorm function in R.</a:t>
+              <a:t>A simple setting for power and sample size calculations is the comparison of two means. I am showing a two-sided hypothesis, but it is pretty easy to modify these calculations for a one-sided hypothesis.</a:t>
+            </a:r>
+          </a:p>
+          <a:p>
+            <a:pPr lvl="0" indent="0" marL="0">
+              <a:buNone/>
+            </a:pPr>
+          </a:p>
+          <a:p>
+            <a:pPr lvl="0" indent="0" marL="0">
+              <a:buNone/>
+            </a:pPr>
+            <a:r>
+              <a:rPr/>
+              <a:t>You should really use a t-distribution here, but the calculations are a bit simpler if you you approximate the t-distribution with a normal (or Z) distribution. The problem when you are trying to estimate a sample size that provides a given power is that you have to account for changes in the degrees of freedom. If your total sample size is above 60, there is so little difference between the t and Z distributions, that you are probably safe.</a:t>
+            </a:r>
+          </a:p>
+          <a:p>
+            <a:pPr lvl="0" indent="0" marL="0">
+              <a:buNone/>
+            </a:pPr>
+          </a:p>
+          <a:p>
+            <a:pPr lvl="0" indent="0" marL="0">
+              <a:buNone/>
+            </a:pPr>
+            <a:r>
+              <a:rPr/>
+              <a:t>But I will show some calculations later that incorporate the t-distribution.</a:t>
             </a:r>
           </a:p>
         </p:txBody>
@@ -691,7 +719,7 @@
           <a:p>
             <a:fld id="{18BDFEC3-8487-43E8-A154-7C12CBC1FFF2}" type="slidenum">
               <a:rPr lang="en-US"/>
-              <a:t>14</a:t>
+              <a:t>11</a:t>
             </a:fld>
             <a:endParaRPr lang="en-US"/>
           </a:p>
@@ -751,7 +779,7 @@
             </a:pPr>
             <a:r>
               <a:rPr/>
-              <a:t>You can calculate power more exactly using a t-distribution. But don’t just replace the z’s with t’s. For one thing, you are trying to calculate the sample size per group, n, but n appears on both sides of the equation. It may not look like it, but the degrees of freedom for the t-distribution is implicitly a function of n.</a:t>
+              <a:t>Here are the formulas for estimating sample size. If you have a one-sided test, the change in the formula is trivial. The change is less trivial for unequal group sizes and/or unequal variances, but the work is more tedious than difficult.</a:t>
             </a:r>
           </a:p>
           <a:p>
@@ -765,63 +793,7 @@
             </a:pPr>
             <a:r>
               <a:rPr/>
-              <a:t>There’s an added complication. The correct sampling distribution of the test statistic under the alternative hypothesis is a non-central t-distribution and the non-central t-dsitribution is not simply a central t-distribution shifted to the left of the right.</a:t>
-            </a:r>
-          </a:p>
-          <a:p>
-            <a:pPr lvl="0" indent="0" marL="0">
-              <a:buNone/>
-            </a:pPr>
-          </a:p>
-          <a:p>
-            <a:pPr lvl="0" indent="0" marL="0">
-              <a:buNone/>
-            </a:pPr>
-            <a:r>
-              <a:rPr/>
-              <a:t>What you have to do is to calculate power and then use trial and error to find a sample size that meets your target power.</a:t>
-            </a:r>
-          </a:p>
-          <a:p>
-            <a:pPr lvl="0" indent="0" marL="0">
-              <a:buNone/>
-            </a:pPr>
-          </a:p>
-          <a:p>
-            <a:pPr lvl="0" indent="0" marL="0">
-              <a:buNone/>
-            </a:pPr>
-            <a:r>
-              <a:rPr/>
-              <a:t>Here is a formula for power. I skipped the precise mathematical formulation because it looks ugly, but that it represents is the probability that a non-central t-distribution exceeds a percentile of the central t-distribution.</a:t>
-            </a:r>
-          </a:p>
-          <a:p>
-            <a:pPr lvl="0" indent="0" marL="0">
-              <a:buNone/>
-            </a:pPr>
-          </a:p>
-          <a:p>
-            <a:pPr lvl="0" indent="0" marL="0">
-              <a:buNone/>
-            </a:pPr>
-            <a:r>
-              <a:rPr/>
-              <a:t>The non-centrality parameter is a function of the sample size and the effect size. A larger sample size leads to a larger non-centrality parameter, which produces higher power. A smaller effect size leads to a smaller non-centrality parameter, which produces lower power.</a:t>
-            </a:r>
-          </a:p>
-          <a:p>
-            <a:pPr lvl="0" indent="0" marL="0">
-              <a:buNone/>
-            </a:pPr>
-          </a:p>
-          <a:p>
-            <a:pPr lvl="0" indent="0" marL="0">
-              <a:buNone/>
-            </a:pPr>
-            <a:r>
-              <a:rPr/>
-              <a:t>Don’t forget that n represents the sample size per group.</a:t>
+              <a:t>It’s important to note here that the value of n is the number of observations in each group, not the sample size across both groups.</a:t>
             </a:r>
           </a:p>
         </p:txBody>
@@ -843,7 +815,7 @@
           <a:p>
             <a:fld id="{18BDFEC3-8487-43E8-A154-7C12CBC1FFF2}" type="slidenum">
               <a:rPr lang="en-US"/>
-              <a:t>15</a:t>
+              <a:t>12</a:t>
             </a:fld>
             <a:endParaRPr lang="en-US"/>
           </a:p>
@@ -903,7 +875,7 @@
             </a:pPr>
             <a:r>
               <a:rPr/>
-              <a:t>Here are the actual power calculations for a sample size of 64 per group and an effect size of 0.5.</a:t>
+              <a:t>An interesting side note is that if you use the most common values for alpha (0.05) and power (0.8, corresponding to a beta of 0.2), the sample size formula simplifies to approximately 16 divided by the effect size squared. So if you know the effect size is half a standard deviation, you can calculate a pretty good approximation in your head. Sixteen divided by 0.5 squared is 64. If the effect size is a ridiculously small one-tenth of a standard deviation, then a good approximation to the sample size is 1,600 per group.</a:t>
             </a:r>
           </a:p>
         </p:txBody>
@@ -925,7 +897,7 @@
           <a:p>
             <a:fld id="{18BDFEC3-8487-43E8-A154-7C12CBC1FFF2}" type="slidenum">
               <a:rPr lang="en-US"/>
-              <a:t>16</a:t>
+              <a:t>13</a:t>
             </a:fld>
             <a:endParaRPr lang="en-US"/>
           </a:p>
@@ -985,35 +957,7 @@
             </a:pPr>
             <a:r>
               <a:rPr/>
-              <a:t>I like to derive the formulas from scratch, but that’s just the mathematician in me. Most of the time, you can and should rely on built-in functions. R has several nice functions for power and sample size calculations.</a:t>
-            </a:r>
-          </a:p>
-          <a:p>
-            <a:pPr lvl="0" indent="0" marL="0">
-              <a:buNone/>
-            </a:pPr>
-          </a:p>
-          <a:p>
-            <a:pPr lvl="0" indent="0" marL="0">
-              <a:buNone/>
-            </a:pPr>
-            <a:r>
-              <a:rPr/>
-              <a:t>The one that you use for a two-sample t-test is the power.t.test function, which is part of base R.</a:t>
-            </a:r>
-          </a:p>
-          <a:p>
-            <a:pPr lvl="0" indent="0" marL="0">
-              <a:buNone/>
-            </a:pPr>
-          </a:p>
-          <a:p>
-            <a:pPr lvl="0" indent="0" marL="0">
-              <a:buNone/>
-            </a:pPr>
-            <a:r>
-              <a:rPr/>
-              <a:t>The nice thing about this function is that it can handle power calculations by setting the power argument to null. But it also does sample size calculations. Specify a value for power and let the argument n equal null. It could also calculate a difference in means that would produce a specified power for a specified sample size by setting delta to null.</a:t>
+              <a:t>Here’s the actual sample size calculation using the qnorm function in R.</a:t>
             </a:r>
           </a:p>
         </p:txBody>
@@ -1035,7 +979,7 @@
           <a:p>
             <a:fld id="{18BDFEC3-8487-43E8-A154-7C12CBC1FFF2}" type="slidenum">
               <a:rPr lang="en-US"/>
-              <a:t>17</a:t>
+              <a:t>14</a:t>
             </a:fld>
             <a:endParaRPr lang="en-US"/>
           </a:p>
@@ -1095,7 +1039,77 @@
             </a:pPr>
             <a:r>
               <a:rPr/>
-              <a:t>The power.t.test function produces a list, and the key argument in the list is power.</a:t>
+              <a:t>You can calculate power more exactly using a t-distribution. But don’t just replace the z’s with t’s. For one thing, you are trying to calculate the sample size per group, n, but n appears on both sides of the equation. It may not look like it, but the degrees of freedom for the t-distribution is implicitly a function of n.</a:t>
+            </a:r>
+          </a:p>
+          <a:p>
+            <a:pPr lvl="0" indent="0" marL="0">
+              <a:buNone/>
+            </a:pPr>
+          </a:p>
+          <a:p>
+            <a:pPr lvl="0" indent="0" marL="0">
+              <a:buNone/>
+            </a:pPr>
+            <a:r>
+              <a:rPr/>
+              <a:t>There’s an added complication. The correct sampling distribution of the test statistic under the alternative hypothesis is a non-central t-distribution and the non-central t-dsitribution is not simply a central t-distribution shifted to the left of the right.</a:t>
+            </a:r>
+          </a:p>
+          <a:p>
+            <a:pPr lvl="0" indent="0" marL="0">
+              <a:buNone/>
+            </a:pPr>
+          </a:p>
+          <a:p>
+            <a:pPr lvl="0" indent="0" marL="0">
+              <a:buNone/>
+            </a:pPr>
+            <a:r>
+              <a:rPr/>
+              <a:t>What you have to do is to calculate power and then use trial and error to find a sample size that meets your target power.</a:t>
+            </a:r>
+          </a:p>
+          <a:p>
+            <a:pPr lvl="0" indent="0" marL="0">
+              <a:buNone/>
+            </a:pPr>
+          </a:p>
+          <a:p>
+            <a:pPr lvl="0" indent="0" marL="0">
+              <a:buNone/>
+            </a:pPr>
+            <a:r>
+              <a:rPr/>
+              <a:t>Here is a formula for power. I skipped the precise mathematical formulation because it looks ugly, but that it represents is the probability that a non-central t-distribution exceeds a percentile of the central t-distribution.</a:t>
+            </a:r>
+          </a:p>
+          <a:p>
+            <a:pPr lvl="0" indent="0" marL="0">
+              <a:buNone/>
+            </a:pPr>
+          </a:p>
+          <a:p>
+            <a:pPr lvl="0" indent="0" marL="0">
+              <a:buNone/>
+            </a:pPr>
+            <a:r>
+              <a:rPr/>
+              <a:t>The non-centrality parameter is a function of the sample size and the effect size. A larger sample size leads to a larger non-centrality parameter, which produces higher power. A smaller effect size leads to a smaller non-centrality parameter, which produces lower power.</a:t>
+            </a:r>
+          </a:p>
+          <a:p>
+            <a:pPr lvl="0" indent="0" marL="0">
+              <a:buNone/>
+            </a:pPr>
+          </a:p>
+          <a:p>
+            <a:pPr lvl="0" indent="0" marL="0">
+              <a:buNone/>
+            </a:pPr>
+            <a:r>
+              <a:rPr/>
+              <a:t>Don’t forget that n represents the sample size per group.</a:t>
             </a:r>
           </a:p>
         </p:txBody>
@@ -1117,7 +1131,7 @@
           <a:p>
             <a:fld id="{18BDFEC3-8487-43E8-A154-7C12CBC1FFF2}" type="slidenum">
               <a:rPr lang="en-US"/>
-              <a:t>18</a:t>
+              <a:t>15</a:t>
             </a:fld>
             <a:endParaRPr lang="en-US"/>
           </a:p>
@@ -1177,21 +1191,7 @@
             </a:pPr>
             <a:r>
               <a:rPr/>
-              <a:t>Here is the estimated power.</a:t>
-            </a:r>
-          </a:p>
-          <a:p>
-            <a:pPr lvl="0" indent="0" marL="0">
-              <a:buNone/>
-            </a:pPr>
-          </a:p>
-          <a:p>
-            <a:pPr lvl="0" indent="0" marL="0">
-              <a:buNone/>
-            </a:pPr>
-            <a:r>
-              <a:rPr/>
-              <a:t>You should also observe that the note argument produces a nice reminder that n is the sample size per group, not the total sample size across both groups.</a:t>
+              <a:t>Here are the actual power calculations for a sample size of 64 per group and an effect size of 0.5.</a:t>
             </a:r>
           </a:p>
         </p:txBody>
@@ -1213,7 +1213,7 @@
           <a:p>
             <a:fld id="{18BDFEC3-8487-43E8-A154-7C12CBC1FFF2}" type="slidenum">
               <a:rPr lang="en-US"/>
-              <a:t>19</a:t>
+              <a:t>16</a:t>
             </a:fld>
             <a:endParaRPr lang="en-US"/>
           </a:p>
@@ -1273,7 +1273,7 @@
             </a:pPr>
             <a:r>
               <a:rPr/>
-              <a:t>There’s a lot more that you can do with R. Base R has functions that can estimate power and sample size for a test of two proportions and for the analysis of variance setting.</a:t>
+              <a:t>I like to derive the formulas from scratch, but that’s just the mathematician in me. Most of the time, you can and should rely on built-in functions. R has several nice functions for power and sample size calculations.</a:t>
             </a:r>
           </a:p>
           <a:p>
@@ -1287,7 +1287,21 @@
             </a:pPr>
             <a:r>
               <a:rPr/>
-              <a:t>There are also many libraries that are worth exploring.</a:t>
+              <a:t>The one that you use for a two-sample t-test is the power.t.test function, which is part of base R.</a:t>
+            </a:r>
+          </a:p>
+          <a:p>
+            <a:pPr lvl="0" indent="0" marL="0">
+              <a:buNone/>
+            </a:pPr>
+          </a:p>
+          <a:p>
+            <a:pPr lvl="0" indent="0" marL="0">
+              <a:buNone/>
+            </a:pPr>
+            <a:r>
+              <a:rPr/>
+              <a:t>The nice thing about this function is that it can handle power calculations by setting the power argument to null. But it also does sample size calculations. Specify a value for power and let the argument n equal null. It could also calculate a difference in means that would produce a specified power for a specified sample size by setting delta to null.</a:t>
             </a:r>
           </a:p>
         </p:txBody>
@@ -1309,7 +1323,7 @@
           <a:p>
             <a:fld id="{18BDFEC3-8487-43E8-A154-7C12CBC1FFF2}" type="slidenum">
               <a:rPr lang="en-US"/>
-              <a:t>20</a:t>
+              <a:t>17</a:t>
             </a:fld>
             <a:endParaRPr lang="en-US"/>
           </a:p>
@@ -1369,49 +1383,7 @@
             </a:pPr>
             <a:r>
               <a:rPr/>
-              <a:t>There is a recent trend in research to use Monte Carlo simulations in place of a simple power calculation. You can build a simulation from scratch. In fact, R is a wonderful package for running simulations.</a:t>
-            </a:r>
-          </a:p>
-          <a:p>
-            <a:pPr lvl="0" indent="0" marL="0">
-              <a:buNone/>
-            </a:pPr>
-          </a:p>
-          <a:p>
-            <a:pPr lvl="0" indent="0" marL="0">
-              <a:buNone/>
-            </a:pPr>
-            <a:r>
-              <a:rPr/>
-              <a:t>There’s even a library that will run simulations for you in the setting of a generalized linear model.</a:t>
-            </a:r>
-          </a:p>
-          <a:p>
-            <a:pPr lvl="0" indent="0" marL="0">
-              <a:buNone/>
-            </a:pPr>
-          </a:p>
-          <a:p>
-            <a:pPr lvl="0" indent="0" marL="0">
-              <a:buNone/>
-            </a:pPr>
-            <a:r>
-              <a:rPr/>
-              <a:t>One area of research I am interested in is Bayesian simulation of clinical trials using Markov Chain Monte Carlo.</a:t>
-            </a:r>
-          </a:p>
-          <a:p>
-            <a:pPr lvl="0" indent="0" marL="0">
-              <a:buNone/>
-            </a:pPr>
-          </a:p>
-          <a:p>
-            <a:pPr lvl="0" indent="0" marL="0">
-              <a:buNone/>
-            </a:pPr>
-            <a:r>
-              <a:rPr/>
-              <a:t>But all of this is well beyond the scope of this talk.</a:t>
+              <a:t>The power.t.test function produces a list, and the key argument in the list is power.</a:t>
             </a:r>
           </a:p>
         </p:txBody>
@@ -1433,7 +1405,7 @@
           <a:p>
             <a:fld id="{18BDFEC3-8487-43E8-A154-7C12CBC1FFF2}" type="slidenum">
               <a:rPr lang="en-US"/>
-              <a:t>21</a:t>
+              <a:t>18</a:t>
             </a:fld>
             <a:endParaRPr lang="en-US"/>
           </a:p>
@@ -1493,7 +1465,7 @@
             </a:pPr>
             <a:r>
               <a:rPr/>
-              <a:t>I should note that there are many research settings where there is no formal hypothesis test. No hypothesis test means no way to calculate power. So what do you do?</a:t>
+              <a:t>Here is the estimated power.</a:t>
             </a:r>
           </a:p>
           <a:p>
@@ -1507,35 +1479,7 @@
             </a:pPr>
             <a:r>
               <a:rPr/>
-              <a:t>For some studies, you can use the width of the confidence interval to estimate sample size.</a:t>
-            </a:r>
-          </a:p>
-          <a:p>
-            <a:pPr lvl="0" indent="0" marL="0">
-              <a:buNone/>
-            </a:pPr>
-          </a:p>
-          <a:p>
-            <a:pPr lvl="0" indent="0" marL="0">
-              <a:buNone/>
-            </a:pPr>
-            <a:r>
-              <a:rPr/>
-              <a:t>For focus groups, researchers often define sample size needs using a concept known as saturation. Saturation is the point at which the focus groups stop providing ideas and concepts other than those already mentioned by previous focus groups.</a:t>
-            </a:r>
-          </a:p>
-          <a:p>
-            <a:pPr lvl="0" indent="0" marL="0">
-              <a:buNone/>
-            </a:pPr>
-          </a:p>
-          <a:p>
-            <a:pPr lvl="0" indent="0" marL="0">
-              <a:buNone/>
-            </a:pPr>
-            <a:r>
-              <a:rPr/>
-              <a:t>You can also rely on the fact that a qualitative study often uses qualitative criteria to determine an appropriate sample size.</a:t>
+              <a:t>You should also observe that the note argument produces a nice reminder that n is the sample size per group, not the total sample size across both groups.</a:t>
             </a:r>
           </a:p>
         </p:txBody>
@@ -1557,7 +1501,103 @@
           <a:p>
             <a:fld id="{18BDFEC3-8487-43E8-A154-7C12CBC1FFF2}" type="slidenum">
               <a:rPr lang="en-US"/>
-              <a:t>22</a:t>
+              <a:t>19</a:t>
+            </a:fld>
+            <a:endParaRPr lang="en-US"/>
+          </a:p>
+        </p:txBody>
+      </p:sp>
+    </p:spTree>
+  </p:cSld>
+</p:notes>
+</file>
+
+<file path=ppt/notesSlides/notesSlide19.xml><?xml version="1.0" encoding="utf-8"?>
+<p:notes xmlns:a="http://schemas.openxmlformats.org/drawingml/2006/main" xmlns:r="http://schemas.openxmlformats.org/officeDocument/2006/relationships" xmlns:p="http://schemas.openxmlformats.org/presentationml/2006/main">
+  <p:cSld>
+    <p:spTree>
+      <p:nvGrpSpPr>
+        <p:cNvPr id="1" name=""/>
+        <p:cNvGrpSpPr/>
+        <p:nvPr/>
+      </p:nvGrpSpPr>
+      <p:grpSpPr>
+        <a:xfrm>
+          <a:off x="0" y="0"/>
+          <a:ext cx="0" cy="0"/>
+          <a:chOff x="0" y="0"/>
+          <a:chExt cx="0" cy="0"/>
+        </a:xfrm>
+      </p:grpSpPr>
+      <p:sp>
+        <p:nvSpPr>
+          <p:cNvPr id="2" name="Slide Image Placeholder 1"/>
+          <p:cNvSpPr>
+            <a:spLocks noGrp="1" noRot="1" noChangeAspect="1"/>
+          </p:cNvSpPr>
+          <p:nvPr>
+            <p:ph type="sldImg"/>
+          </p:nvPr>
+        </p:nvSpPr>
+        <p:spPr/>
+      </p:sp>
+      <p:sp>
+        <p:nvSpPr>
+          <p:cNvPr id="3" name="Notes Placeholder 2"/>
+          <p:cNvSpPr>
+            <a:spLocks noGrp="1"/>
+          </p:cNvSpPr>
+          <p:nvPr>
+            <p:ph type="body" idx="1"/>
+          </p:nvPr>
+        </p:nvSpPr>
+        <p:spPr/>
+        <p:txBody>
+          <a:bodyPr/>
+          <a:lstStyle/>
+          <a:p>
+            <a:pPr lvl="0" indent="0" marL="0">
+              <a:buNone/>
+            </a:pPr>
+            <a:r>
+              <a:rPr/>
+              <a:t>There’s a lot more that you can do with R. Base R has functions that can estimate power and sample size for a test of two proportions and for the analysis of variance setting.</a:t>
+            </a:r>
+          </a:p>
+          <a:p>
+            <a:pPr lvl="0" indent="0" marL="0">
+              <a:buNone/>
+            </a:pPr>
+          </a:p>
+          <a:p>
+            <a:pPr lvl="0" indent="0" marL="0">
+              <a:buNone/>
+            </a:pPr>
+            <a:r>
+              <a:rPr/>
+              <a:t>There are also many libraries that are worth exploring.</a:t>
+            </a:r>
+          </a:p>
+        </p:txBody>
+      </p:sp>
+      <p:sp>
+        <p:nvSpPr>
+          <p:cNvPr id="4" name="Slide Number Placeholder 3"/>
+          <p:cNvSpPr>
+            <a:spLocks noGrp="1"/>
+          </p:cNvSpPr>
+          <p:nvPr>
+            <p:ph type="sldNum" sz="quarter" idx="10"/>
+          </p:nvPr>
+        </p:nvSpPr>
+        <p:spPr/>
+        <p:txBody>
+          <a:bodyPr/>
+          <a:lstStyle/>
+          <a:p>
+            <a:fld id="{18BDFEC3-8487-43E8-A154-7C12CBC1FFF2}" type="slidenum">
+              <a:rPr lang="en-US"/>
+              <a:t>20</a:t>
             </a:fld>
             <a:endParaRPr lang="en-US"/>
           </a:p>
@@ -1617,7 +1657,7 @@
             </a:pPr>
             <a:r>
               <a:rPr/>
-              <a:t>So to emphasize why power and sample size calculations are so important, I tell a fictional story about a researcher who gets a six-year, ten-million-dollar grant and writes up a final report that says “This is a new and innovative surgical approach and we are 95% confident that the cure rate is somewhere between 3% and 98%.”</a:t>
+              <a:t>Many applications in statistics specify two hypotheses about a population parameter. By tradition, the first hypothesis, H0 or the null hypothesis is a hypothesis with an equality and the second hypothesis, H1 or Ha or the alternative hypothesis is a hypothesis with an inequality.</a:t>
             </a:r>
           </a:p>
           <a:p>
@@ -1631,21 +1671,7 @@
             </a:pPr>
             <a:r>
               <a:rPr/>
-              <a:t>Even people who don’t know much about Statistics get the point of this story. If the best confidence interval that you can produce goes from 3% to 98%, you’ve just wasted a lot of money. This is an example of where everything is nothing.</a:t>
-            </a:r>
-          </a:p>
-          <a:p>
-            <a:pPr lvl="0" indent="0" marL="0">
-              <a:buNone/>
-            </a:pPr>
-          </a:p>
-          <a:p>
-            <a:pPr lvl="0" indent="0" marL="0">
-              <a:buNone/>
-            </a:pPr>
-            <a:r>
-              <a:rPr/>
-              <a:t>A real world example, though a bit dated, comes from a paper by Ben Thornley and Clive Adams that reviewed two thousand research papers on schizophrenia published between 1948 and 1997. They found several problems with most of these studies. They studied the wrong patients, they didn’t study them long enough, and they didn’t measure them consistently. But just as big a problem was that they did not study enough research subjects. Thornley and Adams did some “back of the envelope” calculations and established that a decent study of schizophrenia should recruit at least 300 patients. But the average study only recruited 65 patients. Even worse, was that only 3% of all the studies met or exceeded the target sample size of 300.</a:t>
+              <a:t>Here I am using theta as a generic parameter, but usually the hypothesis involves population means represented by the Greek letter mu, population proportions represented by the Greek letter pi, or regression coefficients represented by the Greek letter beta.</a:t>
             </a:r>
           </a:p>
         </p:txBody>
@@ -1667,7 +1693,255 @@
           <a:p>
             <a:fld id="{18BDFEC3-8487-43E8-A154-7C12CBC1FFF2}" type="slidenum">
               <a:rPr lang="en-US"/>
-              <a:t>5</a:t>
+              <a:t>3</a:t>
+            </a:fld>
+            <a:endParaRPr lang="en-US"/>
+          </a:p>
+        </p:txBody>
+      </p:sp>
+    </p:spTree>
+  </p:cSld>
+</p:notes>
+</file>
+
+<file path=ppt/notesSlides/notesSlide20.xml><?xml version="1.0" encoding="utf-8"?>
+<p:notes xmlns:a="http://schemas.openxmlformats.org/drawingml/2006/main" xmlns:r="http://schemas.openxmlformats.org/officeDocument/2006/relationships" xmlns:p="http://schemas.openxmlformats.org/presentationml/2006/main">
+  <p:cSld>
+    <p:spTree>
+      <p:nvGrpSpPr>
+        <p:cNvPr id="1" name=""/>
+        <p:cNvGrpSpPr/>
+        <p:nvPr/>
+      </p:nvGrpSpPr>
+      <p:grpSpPr>
+        <a:xfrm>
+          <a:off x="0" y="0"/>
+          <a:ext cx="0" cy="0"/>
+          <a:chOff x="0" y="0"/>
+          <a:chExt cx="0" cy="0"/>
+        </a:xfrm>
+      </p:grpSpPr>
+      <p:sp>
+        <p:nvSpPr>
+          <p:cNvPr id="2" name="Slide Image Placeholder 1"/>
+          <p:cNvSpPr>
+            <a:spLocks noGrp="1" noRot="1" noChangeAspect="1"/>
+          </p:cNvSpPr>
+          <p:nvPr>
+            <p:ph type="sldImg"/>
+          </p:nvPr>
+        </p:nvSpPr>
+        <p:spPr/>
+      </p:sp>
+      <p:sp>
+        <p:nvSpPr>
+          <p:cNvPr id="3" name="Notes Placeholder 2"/>
+          <p:cNvSpPr>
+            <a:spLocks noGrp="1"/>
+          </p:cNvSpPr>
+          <p:nvPr>
+            <p:ph type="body" idx="1"/>
+          </p:nvPr>
+        </p:nvSpPr>
+        <p:spPr/>
+        <p:txBody>
+          <a:bodyPr/>
+          <a:lstStyle/>
+          <a:p>
+            <a:pPr lvl="0" indent="0" marL="0">
+              <a:buNone/>
+            </a:pPr>
+            <a:r>
+              <a:rPr/>
+              <a:t>There is a recent trend in research to use Monte Carlo simulations in place of a simple power calculation. You can build a simulation from scratch. In fact, R is a wonderful package for running simulations.</a:t>
+            </a:r>
+          </a:p>
+          <a:p>
+            <a:pPr lvl="0" indent="0" marL="0">
+              <a:buNone/>
+            </a:pPr>
+          </a:p>
+          <a:p>
+            <a:pPr lvl="0" indent="0" marL="0">
+              <a:buNone/>
+            </a:pPr>
+            <a:r>
+              <a:rPr/>
+              <a:t>There’s even a library that will run simulations for you in the setting of a generalized linear model.</a:t>
+            </a:r>
+          </a:p>
+          <a:p>
+            <a:pPr lvl="0" indent="0" marL="0">
+              <a:buNone/>
+            </a:pPr>
+          </a:p>
+          <a:p>
+            <a:pPr lvl="0" indent="0" marL="0">
+              <a:buNone/>
+            </a:pPr>
+            <a:r>
+              <a:rPr/>
+              <a:t>One area of research I am interested in is Bayesian simulation of clinical trials using Markov Chain Monte Carlo.</a:t>
+            </a:r>
+          </a:p>
+          <a:p>
+            <a:pPr lvl="0" indent="0" marL="0">
+              <a:buNone/>
+            </a:pPr>
+          </a:p>
+          <a:p>
+            <a:pPr lvl="0" indent="0" marL="0">
+              <a:buNone/>
+            </a:pPr>
+            <a:r>
+              <a:rPr/>
+              <a:t>But all of this is well beyond the scope of this talk.</a:t>
+            </a:r>
+          </a:p>
+        </p:txBody>
+      </p:sp>
+      <p:sp>
+        <p:nvSpPr>
+          <p:cNvPr id="4" name="Slide Number Placeholder 3"/>
+          <p:cNvSpPr>
+            <a:spLocks noGrp="1"/>
+          </p:cNvSpPr>
+          <p:nvPr>
+            <p:ph type="sldNum" sz="quarter" idx="10"/>
+          </p:nvPr>
+        </p:nvSpPr>
+        <p:spPr/>
+        <p:txBody>
+          <a:bodyPr/>
+          <a:lstStyle/>
+          <a:p>
+            <a:fld id="{18BDFEC3-8487-43E8-A154-7C12CBC1FFF2}" type="slidenum">
+              <a:rPr lang="en-US"/>
+              <a:t>21</a:t>
+            </a:fld>
+            <a:endParaRPr lang="en-US"/>
+          </a:p>
+        </p:txBody>
+      </p:sp>
+    </p:spTree>
+  </p:cSld>
+</p:notes>
+</file>
+
+<file path=ppt/notesSlides/notesSlide21.xml><?xml version="1.0" encoding="utf-8"?>
+<p:notes xmlns:a="http://schemas.openxmlformats.org/drawingml/2006/main" xmlns:r="http://schemas.openxmlformats.org/officeDocument/2006/relationships" xmlns:p="http://schemas.openxmlformats.org/presentationml/2006/main">
+  <p:cSld>
+    <p:spTree>
+      <p:nvGrpSpPr>
+        <p:cNvPr id="1" name=""/>
+        <p:cNvGrpSpPr/>
+        <p:nvPr/>
+      </p:nvGrpSpPr>
+      <p:grpSpPr>
+        <a:xfrm>
+          <a:off x="0" y="0"/>
+          <a:ext cx="0" cy="0"/>
+          <a:chOff x="0" y="0"/>
+          <a:chExt cx="0" cy="0"/>
+        </a:xfrm>
+      </p:grpSpPr>
+      <p:sp>
+        <p:nvSpPr>
+          <p:cNvPr id="2" name="Slide Image Placeholder 1"/>
+          <p:cNvSpPr>
+            <a:spLocks noGrp="1" noRot="1" noChangeAspect="1"/>
+          </p:cNvSpPr>
+          <p:nvPr>
+            <p:ph type="sldImg"/>
+          </p:nvPr>
+        </p:nvSpPr>
+        <p:spPr/>
+      </p:sp>
+      <p:sp>
+        <p:nvSpPr>
+          <p:cNvPr id="3" name="Notes Placeholder 2"/>
+          <p:cNvSpPr>
+            <a:spLocks noGrp="1"/>
+          </p:cNvSpPr>
+          <p:nvPr>
+            <p:ph type="body" idx="1"/>
+          </p:nvPr>
+        </p:nvSpPr>
+        <p:spPr/>
+        <p:txBody>
+          <a:bodyPr/>
+          <a:lstStyle/>
+          <a:p>
+            <a:pPr lvl="0" indent="0" marL="0">
+              <a:buNone/>
+            </a:pPr>
+            <a:r>
+              <a:rPr/>
+              <a:t>I should note that there are many research settings where there is no formal hypothesis test. No hypothesis test means no way to calculate power. So what do you do?</a:t>
+            </a:r>
+          </a:p>
+          <a:p>
+            <a:pPr lvl="0" indent="0" marL="0">
+              <a:buNone/>
+            </a:pPr>
+          </a:p>
+          <a:p>
+            <a:pPr lvl="0" indent="0" marL="0">
+              <a:buNone/>
+            </a:pPr>
+            <a:r>
+              <a:rPr/>
+              <a:t>For some studies, you can use the width of the confidence interval to estimate sample size.</a:t>
+            </a:r>
+          </a:p>
+          <a:p>
+            <a:pPr lvl="0" indent="0" marL="0">
+              <a:buNone/>
+            </a:pPr>
+          </a:p>
+          <a:p>
+            <a:pPr lvl="0" indent="0" marL="0">
+              <a:buNone/>
+            </a:pPr>
+            <a:r>
+              <a:rPr/>
+              <a:t>For focus groups, researchers often define sample size needs using a concept known as saturation. Saturation is the point at which the focus groups stop providing ideas and concepts other than those already mentioned by previous focus groups.</a:t>
+            </a:r>
+          </a:p>
+          <a:p>
+            <a:pPr lvl="0" indent="0" marL="0">
+              <a:buNone/>
+            </a:pPr>
+          </a:p>
+          <a:p>
+            <a:pPr lvl="0" indent="0" marL="0">
+              <a:buNone/>
+            </a:pPr>
+            <a:r>
+              <a:rPr/>
+              <a:t>You can also rely on the fact that a qualitative study often uses qualitative criteria to determine an appropriate sample size.</a:t>
+            </a:r>
+          </a:p>
+        </p:txBody>
+      </p:sp>
+      <p:sp>
+        <p:nvSpPr>
+          <p:cNvPr id="4" name="Slide Number Placeholder 3"/>
+          <p:cNvSpPr>
+            <a:spLocks noGrp="1"/>
+          </p:cNvSpPr>
+          <p:nvPr>
+            <p:ph type="sldNum" sz="quarter" idx="10"/>
+          </p:nvPr>
+        </p:nvSpPr>
+        <p:spPr/>
+        <p:txBody>
+          <a:bodyPr/>
+          <a:lstStyle/>
+          <a:p>
+            <a:fld id="{18BDFEC3-8487-43E8-A154-7C12CBC1FFF2}" type="slidenum">
+              <a:rPr lang="en-US"/>
+              <a:t>22</a:t>
             </a:fld>
             <a:endParaRPr lang="en-US"/>
           </a:p>
@@ -1727,7 +2001,21 @@
             </a:pPr>
             <a:r>
               <a:rPr/>
-              <a:t>There’s a lot of good software out there to do power and sample size calculations. One product is PASS, which is an acronym for Power And Sample Size.</a:t>
+              <a:t>I get a lot of questions about sample size, and what I typically need before I can do any calculations are three things.</a:t>
+            </a:r>
+          </a:p>
+          <a:p>
+            <a:pPr lvl="0" indent="0" marL="0">
+              <a:buNone/>
+            </a:pPr>
+          </a:p>
+          <a:p>
+            <a:pPr lvl="0" indent="0" marL="0">
+              <a:buNone/>
+            </a:pPr>
+            <a:r>
+              <a:rPr/>
+              <a:t>First, I need a research hypothesis. Not every research study has a research hypothesis and I’ll talk at the end about what you can do if you do not have a research hypothesis. But most studies do have a research hypothesis. Then I need a measure of variation, typically a standard deviation. If I can get a range, a standard error, a confidence interval, or an interquartile range, I can usually extrapolate. Finally, I need what is often called the minimum clinically important difference.</a:t>
             </a:r>
           </a:p>
         </p:txBody>
@@ -1749,7 +2037,7 @@
           <a:p>
             <a:fld id="{18BDFEC3-8487-43E8-A154-7C12CBC1FFF2}" type="slidenum">
               <a:rPr lang="en-US"/>
-              <a:t>6</a:t>
+              <a:t>4</a:t>
             </a:fld>
             <a:endParaRPr lang="en-US"/>
           </a:p>
@@ -1809,7 +2097,35 @@
             </a:pPr>
             <a:r>
               <a:rPr/>
-              <a:t>Another software program is PiFace. PiFace was written by Russ Lenth. Dr. Lenth recently retired from a teaching position at the University of Iowa. I wrote the first PhD disseration that Dr. Lenth supervised. That was back in 1982. Dr. Lenth got very interested in power and sample size calculations in the early 1990s and wrote some very nice apps. The most recent one, PiFace, is a Java program and it has lots of nice features, such as sliders that allow you to see directly the impact of various changes in sample size affects power or how various changes in power affect sample size.</a:t>
+              <a:t>So to emphasize why power and sample size calculations are so important, I tell a fictional story about a researcher who gets a six-year, ten-million-dollar grant and writes up a final report that says “This is a new and innovative surgical approach and we are 95% confident that the cure rate is somewhere between 3% and 98%.”</a:t>
+            </a:r>
+          </a:p>
+          <a:p>
+            <a:pPr lvl="0" indent="0" marL="0">
+              <a:buNone/>
+            </a:pPr>
+          </a:p>
+          <a:p>
+            <a:pPr lvl="0" indent="0" marL="0">
+              <a:buNone/>
+            </a:pPr>
+            <a:r>
+              <a:rPr/>
+              <a:t>Even people who don’t know much about Statistics get the point of this story. If the best confidence interval that you can produce goes from 3% to 98%, you’ve just wasted a lot of money. This is an example of where everything is nothing.</a:t>
+            </a:r>
+          </a:p>
+          <a:p>
+            <a:pPr lvl="0" indent="0" marL="0">
+              <a:buNone/>
+            </a:pPr>
+          </a:p>
+          <a:p>
+            <a:pPr lvl="0" indent="0" marL="0">
+              <a:buNone/>
+            </a:pPr>
+            <a:r>
+              <a:rPr/>
+              <a:t>A real world example, though a bit dated, comes from a paper by Ben Thornley and Clive Adams that reviewed two thousand research papers on schizophrenia published between 1948 and 1997. They found several problems with most of these studies. They studied the wrong patients, they didn’t study them long enough, and they didn’t measure them consistently. But just as big a problem was that they did not study enough research subjects. Thornley and Adams did some “back of the envelope” calculations and established that a decent study of schizophrenia should recruit at least 300 patients. But the average study only recruited 65 patients. Even worse, was that only 3% of all the studies met or exceeded the target sample size of 300.</a:t>
             </a:r>
           </a:p>
         </p:txBody>
@@ -1831,7 +2147,7 @@
           <a:p>
             <a:fld id="{18BDFEC3-8487-43E8-A154-7C12CBC1FFF2}" type="slidenum">
               <a:rPr lang="en-US"/>
-              <a:t>7</a:t>
+              <a:t>5</a:t>
             </a:fld>
             <a:endParaRPr lang="en-US"/>
           </a:p>
@@ -1891,7 +2207,7 @@
             </a:pPr>
             <a:r>
               <a:rPr/>
-              <a:t>I know it will make me unpopular with this audience, but SAS has a very nice set of power and sample size calculation software. It was written by Ralph O’Brien and John Castelloe. Dr. Castelloe wrote the second PhD dissertation that Dr. Lenth supervised. Ralph O’Brien had written some SAS macro programs for power and sample size calculation (UnifyPow) that got integrated into SAS under the name “proc power” with the help of Dr. Castelloe.</a:t>
+              <a:t>There’s a lot of good software out there to do power and sample size calculations. One product is PASS, which is an acronym for Power And Sample Size.</a:t>
             </a:r>
           </a:p>
         </p:txBody>
@@ -1913,7 +2229,7 @@
           <a:p>
             <a:fld id="{18BDFEC3-8487-43E8-A154-7C12CBC1FFF2}" type="slidenum">
               <a:rPr lang="en-US"/>
-              <a:t>8</a:t>
+              <a:t>6</a:t>
             </a:fld>
             <a:endParaRPr lang="en-US"/>
           </a:p>
@@ -1973,7 +2289,7 @@
             </a:pPr>
             <a:r>
               <a:rPr/>
-              <a:t>There’s a lot of other good software out there. Among the three listed here, I have used nQuery advisor and like it a lot. It was written by Janet Elashoff. She wrote an NIH grant a few years ago that said something along the lines of “Your review panels at NIH often have to cope with incomplete, inaccurate, or poorly documented power and sample size calculations. Give me a bit of money and I’ll write some software that will help grant writers do better with these calculations.”</a:t>
+              <a:t>Another software program is PiFace. PiFace was written by Russ Lenth. Dr. Lenth recently retired from a teaching position at the University of Iowa. I wrote the first PhD disseration that Dr. Lenth supervised. That was back in 1982. Dr. Lenth got very interested in power and sample size calculations in the early 1990s and wrote some very nice apps. The most recent one, PiFace, is a Java program and it has lots of nice features, such as sliders that allow you to see directly the impact of various changes in sample size affects power or how various changes in power affect sample size.</a:t>
             </a:r>
           </a:p>
         </p:txBody>
@@ -1995,7 +2311,7 @@
           <a:p>
             <a:fld id="{18BDFEC3-8487-43E8-A154-7C12CBC1FFF2}" type="slidenum">
               <a:rPr lang="en-US"/>
-              <a:t>9</a:t>
+              <a:t>7</a:t>
             </a:fld>
             <a:endParaRPr lang="en-US"/>
           </a:p>
@@ -2055,35 +2371,7 @@
             </a:pPr>
             <a:r>
               <a:rPr/>
-              <a:t>A simple setting for power and sample size calculations is the comparison of two means. I am showing a two-sided hypothesis, but it is pretty easy to modify these calculations for a one-sided hypothesis.</a:t>
-            </a:r>
-          </a:p>
-          <a:p>
-            <a:pPr lvl="0" indent="0" marL="0">
-              <a:buNone/>
-            </a:pPr>
-          </a:p>
-          <a:p>
-            <a:pPr lvl="0" indent="0" marL="0">
-              <a:buNone/>
-            </a:pPr>
-            <a:r>
-              <a:rPr/>
-              <a:t>You should really use a t-distribution here, but the calculations are a bit simpler if you you approximate the t-distribution with a normal (or Z) distribution. The problem when you are trying to estimate a sample size that provides a given power is that you have to account for changes in the degrees of freedom. If your total sample size is above 60, there is so little difference between the t and Z distributions, that you are probably safe.</a:t>
-            </a:r>
-          </a:p>
-          <a:p>
-            <a:pPr lvl="0" indent="0" marL="0">
-              <a:buNone/>
-            </a:pPr>
-          </a:p>
-          <a:p>
-            <a:pPr lvl="0" indent="0" marL="0">
-              <a:buNone/>
-            </a:pPr>
-            <a:r>
-              <a:rPr/>
-              <a:t>But I will show some calculations later that incorporate the t-distribution.</a:t>
+              <a:t>I know it will make me unpopular with this audience, but SAS has a very nice set of power and sample size calculation software. It was written by Ralph O’Brien and John Castelloe. Dr. Castelloe wrote the second PhD dissertation that Dr. Lenth supervised. Ralph O’Brien had written some SAS macro programs for power and sample size calculation (UnifyPow) that got integrated into SAS under the name “proc power” with the help of Dr. Castelloe.</a:t>
             </a:r>
           </a:p>
         </p:txBody>
@@ -2105,7 +2393,7 @@
           <a:p>
             <a:fld id="{18BDFEC3-8487-43E8-A154-7C12CBC1FFF2}" type="slidenum">
               <a:rPr lang="en-US"/>
-              <a:t>11</a:t>
+              <a:t>8</a:t>
             </a:fld>
             <a:endParaRPr lang="en-US"/>
           </a:p>
@@ -2165,21 +2453,7 @@
             </a:pPr>
             <a:r>
               <a:rPr/>
-              <a:t>Here are the formulas for estimating sample size. If you have a one-sided test, the change in the formula is trivial. The change is less trivial for unequal group sizes and/or unequal variances, but the work is more tedious than difficult.</a:t>
-            </a:r>
-          </a:p>
-          <a:p>
-            <a:pPr lvl="0" indent="0" marL="0">
-              <a:buNone/>
-            </a:pPr>
-          </a:p>
-          <a:p>
-            <a:pPr lvl="0" indent="0" marL="0">
-              <a:buNone/>
-            </a:pPr>
-            <a:r>
-              <a:rPr/>
-              <a:t>It’s important to note here that the value of n is the number of observations in each group, not the sample size across both groups.</a:t>
+              <a:t>There’s a lot of other good software out there. Among the three listed here, I have used nQuery advisor and like it a lot. It was written by Janet Elashoff. She wrote an NIH grant a few years ago that said something along the lines of “Your review panels at NIH often have to cope with incomplete, inaccurate, or poorly documented power and sample size calculations. Give me a bit of money and I’ll write some software that will help grant writers do better with these calculations.”</a:t>
             </a:r>
           </a:p>
         </p:txBody>
@@ -2201,7 +2475,7 @@
           <a:p>
             <a:fld id="{18BDFEC3-8487-43E8-A154-7C12CBC1FFF2}" type="slidenum">
               <a:rPr lang="en-US"/>
-              <a:t>12</a:t>
+              <a:t>9</a:t>
             </a:fld>
             <a:endParaRPr lang="en-US"/>
           </a:p>
@@ -2261,7 +2535,7 @@
             </a:pPr>
             <a:r>
               <a:rPr/>
-              <a:t>An interesting side note is that if you use the most common values for alpha (0.05) and power (0.8, corresponding to a beta of 0.2), the sample size formula simplifies to approximately 16 divided by the effect size squared. So if you know the effect size is half a standard deviation, you can calculate a pretty good approximation in your head. Sixteen divided by 0.5 squared is 64. If the effect size is a ridiculously small one-tenth of a standard deviation, then a good approximation to the sample size is 1,600 per group.</a:t>
+              <a:t>I want to show three different approaches to sample size calculations. Two involve programming from scratch, but you may find the power.t.test function to be easier to work with.</a:t>
             </a:r>
           </a:p>
         </p:txBody>
@@ -2283,7 +2557,7 @@
           <a:p>
             <a:fld id="{18BDFEC3-8487-43E8-A154-7C12CBC1FFF2}" type="slidenum">
               <a:rPr lang="en-US"/>
-              <a:t>13</a:t>
+              <a:t>10</a:t>
             </a:fld>
             <a:endParaRPr lang="en-US"/>
           </a:p>
@@ -7470,7 +7744,7 @@
             </a:pPr>
             <a:r>
               <a:rPr/>
-              <a:t>Using power.t.test (1/2)</a:t>
+              <a:t>Using power.t.test (1/3)</a:t>
             </a:r>
           </a:p>
         </p:txBody>
@@ -7798,7 +8072,7 @@
             </a:pPr>
             <a:r>
               <a:rPr/>
-              <a:t>Using power.t.test (2/2)</a:t>
+              <a:t>Using power.t.test (2/3)</a:t>
             </a:r>
           </a:p>
         </p:txBody>
@@ -7893,7 +8167,7 @@
             </a:pPr>
             <a:r>
               <a:rPr/>
-              <a:t>Using power.t.test (2/2)</a:t>
+              <a:t>Using power.t.test (3/3)</a:t>
             </a:r>
           </a:p>
         </p:txBody>
@@ -8722,18 +8996,25 @@
             <a:pPr lvl="0"/>
             <a:r>
               <a:rPr/>
+              <a:t>To determine the appropriate sample size, you need</a:t>
+            </a:r>
+          </a:p>
+          <a:p>
+            <a:pPr lvl="1"/>
+            <a:r>
+              <a:rPr/>
               <a:t>Research hypothesis</a:t>
             </a:r>
           </a:p>
           <a:p>
-            <a:pPr lvl="0"/>
+            <a:pPr lvl="1"/>
             <a:r>
               <a:rPr/>
               <a:t>Standard deviation of your outcome measure</a:t>
             </a:r>
           </a:p>
           <a:p>
-            <a:pPr lvl="0"/>
+            <a:pPr lvl="1"/>
             <a:r>
               <a:rPr/>
               <a:t>Minimum clinically important difference</a:t>

</xml_diff>